<commit_message>
Day 2 model runs
</commit_message>
<xml_diff>
--- a/Sculley_AssessmentPres.pptx
+++ b/Sculley_AssessmentPres.pptx
@@ -41,6 +41,11 @@
     <p:sldId id="291" r:id="rId35"/>
     <p:sldId id="292" r:id="rId36"/>
     <p:sldId id="293" r:id="rId37"/>
+    <p:sldId id="300" r:id="rId38"/>
+    <p:sldId id="301" r:id="rId39"/>
+    <p:sldId id="302" r:id="rId40"/>
+    <p:sldId id="303" r:id="rId41"/>
+    <p:sldId id="304" r:id="rId42"/>
   </p:sldIdLst>
   <p:sldSz cx="9144000" cy="5143500" type="screen16x9"/>
   <p:notesSz cx="6858000" cy="9144000"/>
@@ -337,7 +342,7 @@
           <a:p>
             <a:fld id="{241EB5C9-1307-BA42-ABA2-0BC069CD8E7F}" type="datetimeFigureOut">
               <a:rPr lang="en-US" smtClean="0"/>
-              <a:t>4/11/2023</a:t>
+              <a:t>4/13/2023</a:t>
             </a:fld>
             <a:endParaRPr lang="en-US"/>
           </a:p>
@@ -505,7 +510,7 @@
           <a:p>
             <a:fld id="{241EB5C9-1307-BA42-ABA2-0BC069CD8E7F}" type="datetimeFigureOut">
               <a:rPr lang="en-US" smtClean="0"/>
-              <a:t>4/11/2023</a:t>
+              <a:t>4/13/2023</a:t>
             </a:fld>
             <a:endParaRPr lang="en-US"/>
           </a:p>
@@ -683,7 +688,7 @@
           <a:p>
             <a:fld id="{241EB5C9-1307-BA42-ABA2-0BC069CD8E7F}" type="datetimeFigureOut">
               <a:rPr lang="en-US" smtClean="0"/>
-              <a:t>4/11/2023</a:t>
+              <a:t>4/13/2023</a:t>
             </a:fld>
             <a:endParaRPr lang="en-US"/>
           </a:p>
@@ -851,7 +856,7 @@
           <a:p>
             <a:fld id="{241EB5C9-1307-BA42-ABA2-0BC069CD8E7F}" type="datetimeFigureOut">
               <a:rPr lang="en-US" smtClean="0"/>
-              <a:t>4/11/2023</a:t>
+              <a:t>4/13/2023</a:t>
             </a:fld>
             <a:endParaRPr lang="en-US"/>
           </a:p>
@@ -1096,7 +1101,7 @@
           <a:p>
             <a:fld id="{241EB5C9-1307-BA42-ABA2-0BC069CD8E7F}" type="datetimeFigureOut">
               <a:rPr lang="en-US" smtClean="0"/>
-              <a:t>4/11/2023</a:t>
+              <a:t>4/13/2023</a:t>
             </a:fld>
             <a:endParaRPr lang="en-US"/>
           </a:p>
@@ -1381,7 +1386,7 @@
           <a:p>
             <a:fld id="{241EB5C9-1307-BA42-ABA2-0BC069CD8E7F}" type="datetimeFigureOut">
               <a:rPr lang="en-US" smtClean="0"/>
-              <a:t>4/11/2023</a:t>
+              <a:t>4/13/2023</a:t>
             </a:fld>
             <a:endParaRPr lang="en-US"/>
           </a:p>
@@ -1800,7 +1805,7 @@
           <a:p>
             <a:fld id="{241EB5C9-1307-BA42-ABA2-0BC069CD8E7F}" type="datetimeFigureOut">
               <a:rPr lang="en-US" smtClean="0"/>
-              <a:t>4/11/2023</a:t>
+              <a:t>4/13/2023</a:t>
             </a:fld>
             <a:endParaRPr lang="en-US"/>
           </a:p>
@@ -1917,7 +1922,7 @@
           <a:p>
             <a:fld id="{241EB5C9-1307-BA42-ABA2-0BC069CD8E7F}" type="datetimeFigureOut">
               <a:rPr lang="en-US" smtClean="0"/>
-              <a:t>4/11/2023</a:t>
+              <a:t>4/13/2023</a:t>
             </a:fld>
             <a:endParaRPr lang="en-US"/>
           </a:p>
@@ -2012,7 +2017,7 @@
           <a:p>
             <a:fld id="{241EB5C9-1307-BA42-ABA2-0BC069CD8E7F}" type="datetimeFigureOut">
               <a:rPr lang="en-US" smtClean="0"/>
-              <a:t>4/11/2023</a:t>
+              <a:t>4/13/2023</a:t>
             </a:fld>
             <a:endParaRPr lang="en-US"/>
           </a:p>
@@ -2287,7 +2292,7 @@
           <a:p>
             <a:fld id="{241EB5C9-1307-BA42-ABA2-0BC069CD8E7F}" type="datetimeFigureOut">
               <a:rPr lang="en-US" smtClean="0"/>
-              <a:t>4/11/2023</a:t>
+              <a:t>4/13/2023</a:t>
             </a:fld>
             <a:endParaRPr lang="en-US"/>
           </a:p>
@@ -2539,7 +2544,7 @@
           <a:p>
             <a:fld id="{241EB5C9-1307-BA42-ABA2-0BC069CD8E7F}" type="datetimeFigureOut">
               <a:rPr lang="en-US" smtClean="0"/>
-              <a:t>4/11/2023</a:t>
+              <a:t>4/13/2023</a:t>
             </a:fld>
             <a:endParaRPr lang="en-US"/>
           </a:p>
@@ -2750,7 +2755,7 @@
           <a:p>
             <a:fld id="{241EB5C9-1307-BA42-ABA2-0BC069CD8E7F}" type="datetimeFigureOut">
               <a:rPr lang="en-US" smtClean="0"/>
-              <a:t>4/11/2023</a:t>
+              <a:t>4/13/2023</a:t>
             </a:fld>
             <a:endParaRPr lang="en-US"/>
           </a:p>
@@ -6960,6 +6965,433 @@
 </p:sld>
 </file>
 
+<file path=ppt/slides/slide37.xml><?xml version="1.0" encoding="utf-8"?>
+<p:sld xmlns:a="http://schemas.openxmlformats.org/drawingml/2006/main" xmlns:r="http://schemas.openxmlformats.org/officeDocument/2006/relationships" xmlns:p="http://schemas.openxmlformats.org/presentationml/2006/main">
+  <p:cSld>
+    <p:spTree>
+      <p:nvGrpSpPr>
+        <p:cNvPr id="1" name=""/>
+        <p:cNvGrpSpPr/>
+        <p:nvPr/>
+      </p:nvGrpSpPr>
+      <p:grpSpPr>
+        <a:xfrm>
+          <a:off x="0" y="0"/>
+          <a:ext cx="0" cy="0"/>
+          <a:chOff x="0" y="0"/>
+          <a:chExt cx="0" cy="0"/>
+        </a:xfrm>
+      </p:grpSpPr>
+      <p:sp>
+        <p:nvSpPr>
+          <p:cNvPr id="5" name="Title 4"/>
+          <p:cNvSpPr>
+            <a:spLocks noGrp="1"/>
+          </p:cNvSpPr>
+          <p:nvPr>
+            <p:ph type="title"/>
+          </p:nvPr>
+        </p:nvSpPr>
+        <p:spPr/>
+        <p:txBody>
+          <a:bodyPr>
+            <a:normAutofit fontScale="90000"/>
+          </a:bodyPr>
+          <a:lstStyle/>
+          <a:p>
+            <a:r>
+              <a:rPr lang="en-US" dirty="0" smtClean="0"/>
+              <a:t>April 13, 2023 </a:t>
+            </a:r>
+            <a:br>
+              <a:rPr lang="en-US" dirty="0" smtClean="0"/>
+            </a:br>
+            <a:r>
+              <a:rPr lang="en-US" dirty="0" smtClean="0"/>
+              <a:t>Model 3_combine 1 and 2</a:t>
+            </a:r>
+            <a:endParaRPr lang="en-US" dirty="0"/>
+          </a:p>
+        </p:txBody>
+      </p:sp>
+      <p:sp>
+        <p:nvSpPr>
+          <p:cNvPr id="6" name="Content Placeholder 5"/>
+          <p:cNvSpPr>
+            <a:spLocks noGrp="1"/>
+          </p:cNvSpPr>
+          <p:nvPr>
+            <p:ph idx="1"/>
+          </p:nvPr>
+        </p:nvSpPr>
+        <p:spPr/>
+        <p:txBody>
+          <a:bodyPr>
+            <a:normAutofit fontScale="92500" lnSpcReduction="20000"/>
+          </a:bodyPr>
+          <a:lstStyle/>
+          <a:p>
+            <a:r>
+              <a:rPr lang="en-US" dirty="0" smtClean="0"/>
+              <a:t>Dropped S4 and S8 (lambda = 0)</a:t>
+            </a:r>
+          </a:p>
+          <a:p>
+            <a:r>
+              <a:rPr lang="en-US" dirty="0" smtClean="0"/>
+              <a:t>Included corresponding time block to TWN CPUE as used in TWN size comp</a:t>
+            </a:r>
+          </a:p>
+          <a:p>
+            <a:r>
+              <a:rPr lang="en-US" dirty="0" smtClean="0"/>
+              <a:t>Separated US deep size data into 2 fleets:</a:t>
+            </a:r>
+          </a:p>
+          <a:p>
+            <a:pPr lvl="1"/>
+            <a:r>
+              <a:rPr lang="en-US" dirty="0" smtClean="0"/>
+              <a:t>Fleet 9 is only quarters 1 and 2</a:t>
+            </a:r>
+          </a:p>
+          <a:p>
+            <a:pPr lvl="1"/>
+            <a:r>
+              <a:rPr lang="en-US" dirty="0" smtClean="0"/>
+              <a:t>Fleet 20 is only quarters 3 and 4</a:t>
+            </a:r>
+          </a:p>
+          <a:p>
+            <a:pPr lvl="2"/>
+            <a:r>
+              <a:rPr lang="en-US" dirty="0" smtClean="0"/>
+              <a:t>All fish 85 cm and larger are in quarter 4</a:t>
+            </a:r>
+          </a:p>
+          <a:p>
+            <a:pPr lvl="2"/>
+            <a:r>
+              <a:rPr lang="en-US" dirty="0" smtClean="0"/>
+              <a:t>All fish 80 cm and smaller are in quarter 3</a:t>
+            </a:r>
+          </a:p>
+          <a:p>
+            <a:pPr lvl="2"/>
+            <a:r>
+              <a:rPr lang="en-US" dirty="0" smtClean="0"/>
+              <a:t>All quarter 4 inputs are given negative years – the model won’t include their fits in the likelihood but will still fit the data</a:t>
+            </a:r>
+          </a:p>
+          <a:p>
+            <a:r>
+              <a:rPr lang="en-US" dirty="0" smtClean="0"/>
+              <a:t>Normal Prior on R0 – mean of 7, standard deviation of 0.2</a:t>
+            </a:r>
+            <a:endParaRPr lang="en-US" dirty="0"/>
+          </a:p>
+        </p:txBody>
+      </p:sp>
+    </p:spTree>
+    <p:extLst>
+      <p:ext uri="{BB962C8B-B14F-4D97-AF65-F5344CB8AC3E}">
+        <p14:creationId xmlns:p14="http://schemas.microsoft.com/office/powerpoint/2010/main" val="548676666"/>
+      </p:ext>
+    </p:extLst>
+  </p:cSld>
+  <p:clrMapOvr>
+    <a:masterClrMapping/>
+  </p:clrMapOvr>
+</p:sld>
+</file>
+
+<file path=ppt/slides/slide38.xml><?xml version="1.0" encoding="utf-8"?>
+<p:sld xmlns:a="http://schemas.openxmlformats.org/drawingml/2006/main" xmlns:r="http://schemas.openxmlformats.org/officeDocument/2006/relationships" xmlns:p="http://schemas.openxmlformats.org/presentationml/2006/main">
+  <p:cSld>
+    <p:spTree>
+      <p:nvGrpSpPr>
+        <p:cNvPr id="1" name=""/>
+        <p:cNvGrpSpPr/>
+        <p:nvPr/>
+      </p:nvGrpSpPr>
+      <p:grpSpPr>
+        <a:xfrm>
+          <a:off x="0" y="0"/>
+          <a:ext cx="0" cy="0"/>
+          <a:chOff x="0" y="0"/>
+          <a:chExt cx="0" cy="0"/>
+        </a:xfrm>
+      </p:grpSpPr>
+      <p:sp>
+        <p:nvSpPr>
+          <p:cNvPr id="2" name="Title 1"/>
+          <p:cNvSpPr>
+            <a:spLocks noGrp="1"/>
+          </p:cNvSpPr>
+          <p:nvPr>
+            <p:ph type="title"/>
+          </p:nvPr>
+        </p:nvSpPr>
+        <p:spPr/>
+        <p:txBody>
+          <a:bodyPr/>
+          <a:lstStyle/>
+          <a:p>
+            <a:r>
+              <a:rPr lang="en-US" dirty="0" smtClean="0"/>
+              <a:t>Results</a:t>
+            </a:r>
+            <a:endParaRPr lang="en-US" dirty="0"/>
+          </a:p>
+        </p:txBody>
+      </p:sp>
+      <p:sp>
+        <p:nvSpPr>
+          <p:cNvPr id="3" name="Content Placeholder 2"/>
+          <p:cNvSpPr>
+            <a:spLocks noGrp="1"/>
+          </p:cNvSpPr>
+          <p:nvPr>
+            <p:ph idx="1"/>
+          </p:nvPr>
+        </p:nvSpPr>
+        <p:spPr/>
+        <p:txBody>
+          <a:bodyPr/>
+          <a:lstStyle/>
+          <a:p>
+            <a:r>
+              <a:rPr lang="en-US" dirty="0" smtClean="0"/>
+              <a:t>R0 estimate is 11</a:t>
+            </a:r>
+            <a:endParaRPr lang="en-US" dirty="0"/>
+          </a:p>
+        </p:txBody>
+      </p:sp>
+    </p:spTree>
+    <p:extLst>
+      <p:ext uri="{BB962C8B-B14F-4D97-AF65-F5344CB8AC3E}">
+        <p14:creationId xmlns:p14="http://schemas.microsoft.com/office/powerpoint/2010/main" val="2727909969"/>
+      </p:ext>
+    </p:extLst>
+  </p:cSld>
+  <p:clrMapOvr>
+    <a:masterClrMapping/>
+  </p:clrMapOvr>
+</p:sld>
+</file>
+
+<file path=ppt/slides/slide39.xml><?xml version="1.0" encoding="utf-8"?>
+<p:sld xmlns:a="http://schemas.openxmlformats.org/drawingml/2006/main" xmlns:r="http://schemas.openxmlformats.org/officeDocument/2006/relationships" xmlns:p="http://schemas.openxmlformats.org/presentationml/2006/main">
+  <p:cSld>
+    <p:spTree>
+      <p:nvGrpSpPr>
+        <p:cNvPr id="1" name=""/>
+        <p:cNvGrpSpPr/>
+        <p:nvPr/>
+      </p:nvGrpSpPr>
+      <p:grpSpPr>
+        <a:xfrm>
+          <a:off x="0" y="0"/>
+          <a:ext cx="0" cy="0"/>
+          <a:chOff x="0" y="0"/>
+          <a:chExt cx="0" cy="0"/>
+        </a:xfrm>
+      </p:grpSpPr>
+      <p:sp>
+        <p:nvSpPr>
+          <p:cNvPr id="2" name="Title 1"/>
+          <p:cNvSpPr>
+            <a:spLocks noGrp="1"/>
+          </p:cNvSpPr>
+          <p:nvPr>
+            <p:ph type="title"/>
+          </p:nvPr>
+        </p:nvSpPr>
+        <p:spPr/>
+        <p:txBody>
+          <a:bodyPr/>
+          <a:lstStyle/>
+          <a:p>
+            <a:r>
+              <a:rPr lang="en-US" dirty="0" smtClean="0"/>
+              <a:t>What’s happening</a:t>
+            </a:r>
+            <a:endParaRPr lang="en-US" dirty="0"/>
+          </a:p>
+        </p:txBody>
+      </p:sp>
+      <p:sp>
+        <p:nvSpPr>
+          <p:cNvPr id="3" name="Content Placeholder 2"/>
+          <p:cNvSpPr>
+            <a:spLocks noGrp="1"/>
+          </p:cNvSpPr>
+          <p:nvPr>
+            <p:ph type="body" idx="1"/>
+          </p:nvPr>
+        </p:nvSpPr>
+        <p:spPr/>
+        <p:txBody>
+          <a:bodyPr>
+            <a:normAutofit fontScale="62500" lnSpcReduction="20000"/>
+          </a:bodyPr>
+          <a:lstStyle/>
+          <a:p>
+            <a:r>
+              <a:rPr lang="en-US" dirty="0" smtClean="0"/>
+              <a:t>The likelihood profile for the model with a single US deep size comp fleet has a very flat likelihood above the MLE estimate of R0</a:t>
+            </a:r>
+            <a:endParaRPr lang="en-US" dirty="0"/>
+          </a:p>
+        </p:txBody>
+      </p:sp>
+      <p:sp>
+        <p:nvSpPr>
+          <p:cNvPr id="6" name="Text Placeholder 5"/>
+          <p:cNvSpPr>
+            <a:spLocks noGrp="1"/>
+          </p:cNvSpPr>
+          <p:nvPr>
+            <p:ph type="body" sz="quarter" idx="3"/>
+          </p:nvPr>
+        </p:nvSpPr>
+        <p:spPr/>
+        <p:txBody>
+          <a:bodyPr>
+            <a:normAutofit fontScale="55000" lnSpcReduction="20000"/>
+          </a:bodyPr>
+          <a:lstStyle/>
+          <a:p>
+            <a:r>
+              <a:rPr lang="en-US" dirty="0" smtClean="0"/>
+              <a:t>Of the information available to inform the upper bound of R0 – most of it comes from the US deep size data, it is the largest contributor to the likelihood.</a:t>
+            </a:r>
+            <a:endParaRPr lang="en-US" dirty="0"/>
+          </a:p>
+        </p:txBody>
+      </p:sp>
+      <p:pic>
+        <p:nvPicPr>
+          <p:cNvPr id="8" name="Content Placeholder 7" descr="fig:  ModelDev/Current%20Best/plots/Overall_Likelihood.png"/>
+          <p:cNvPicPr>
+            <a:picLocks noGrp="1" noChangeAspect="1"/>
+          </p:cNvPicPr>
+          <p:nvPr>
+            <p:ph sz="half" idx="2"/>
+          </p:nvPr>
+        </p:nvPicPr>
+        <p:blipFill>
+          <a:blip r:embed="rId2"/>
+          <a:stretch>
+            <a:fillRect/>
+          </a:stretch>
+        </p:blipFill>
+        <p:spPr bwMode="auto">
+          <a:xfrm>
+            <a:off x="861251" y="1600391"/>
+            <a:ext cx="2963862" cy="2963862"/>
+          </a:xfrm>
+          <a:prstGeom prst="rect">
+            <a:avLst/>
+          </a:prstGeom>
+          <a:noFill/>
+          <a:ln w="9525">
+            <a:noFill/>
+            <a:headEnd/>
+            <a:tailEnd/>
+          </a:ln>
+        </p:spPr>
+      </p:pic>
+      <p:pic>
+        <p:nvPicPr>
+          <p:cNvPr id="9" name="Content Placeholder 8" descr="fig:  ModelDev/Current%20Best/plots/Size_Likelihood.png"/>
+          <p:cNvPicPr>
+            <a:picLocks noGrp="1" noChangeAspect="1"/>
+          </p:cNvPicPr>
+          <p:nvPr>
+            <p:ph sz="quarter" idx="4"/>
+          </p:nvPr>
+        </p:nvPicPr>
+        <p:blipFill>
+          <a:blip r:embed="rId3"/>
+          <a:stretch>
+            <a:fillRect/>
+          </a:stretch>
+        </p:blipFill>
+        <p:spPr bwMode="auto">
+          <a:xfrm>
+            <a:off x="5183982" y="1643349"/>
+            <a:ext cx="2963862" cy="2963862"/>
+          </a:xfrm>
+          <a:prstGeom prst="rect">
+            <a:avLst/>
+          </a:prstGeom>
+          <a:noFill/>
+          <a:ln w="9525">
+            <a:noFill/>
+            <a:headEnd/>
+            <a:tailEnd/>
+          </a:ln>
+        </p:spPr>
+      </p:pic>
+      <p:sp>
+        <p:nvSpPr>
+          <p:cNvPr id="10" name="Rectangle 9"/>
+          <p:cNvSpPr/>
+          <p:nvPr/>
+        </p:nvSpPr>
+        <p:spPr>
+          <a:xfrm>
+            <a:off x="6720840" y="3797808"/>
+            <a:ext cx="1243584" cy="326136"/>
+          </a:xfrm>
+          <a:prstGeom prst="rect">
+            <a:avLst/>
+          </a:prstGeom>
+          <a:noFill/>
+          <a:ln w="19050">
+            <a:solidFill>
+              <a:srgbClr val="C00000"/>
+            </a:solidFill>
+          </a:ln>
+        </p:spPr>
+        <p:style>
+          <a:lnRef idx="1">
+            <a:schemeClr val="accent1"/>
+          </a:lnRef>
+          <a:fillRef idx="3">
+            <a:schemeClr val="accent1"/>
+          </a:fillRef>
+          <a:effectRef idx="2">
+            <a:schemeClr val="accent1"/>
+          </a:effectRef>
+          <a:fontRef idx="minor">
+            <a:schemeClr val="lt1"/>
+          </a:fontRef>
+        </p:style>
+        <p:txBody>
+          <a:bodyPr rtlCol="0" anchor="ctr"/>
+          <a:lstStyle/>
+          <a:p>
+            <a:pPr algn="ctr"/>
+            <a:endParaRPr lang="en-US"/>
+          </a:p>
+        </p:txBody>
+      </p:sp>
+    </p:spTree>
+    <p:extLst>
+      <p:ext uri="{BB962C8B-B14F-4D97-AF65-F5344CB8AC3E}">
+        <p14:creationId xmlns:p14="http://schemas.microsoft.com/office/powerpoint/2010/main" val="1663573916"/>
+      </p:ext>
+    </p:extLst>
+  </p:cSld>
+  <p:clrMapOvr>
+    <a:masterClrMapping/>
+  </p:clrMapOvr>
+</p:sld>
+</file>
+
 <file path=ppt/slides/slide4.xml><?xml version="1.0" encoding="utf-8"?>
 <p:sld xmlns:a="http://schemas.openxmlformats.org/drawingml/2006/main" xmlns:r="http://schemas.openxmlformats.org/officeDocument/2006/relationships" xmlns:p="http://schemas.openxmlformats.org/presentationml/2006/main">
   <p:cSld>
@@ -7049,6 +7481,315 @@
       </p:par>
     </p:tnLst>
   </p:timing>
+</p:sld>
+</file>
+
+<file path=ppt/slides/slide40.xml><?xml version="1.0" encoding="utf-8"?>
+<p:sld xmlns:a="http://schemas.openxmlformats.org/drawingml/2006/main" xmlns:r="http://schemas.openxmlformats.org/officeDocument/2006/relationships" xmlns:p="http://schemas.openxmlformats.org/presentationml/2006/main">
+  <p:cSld>
+    <p:spTree>
+      <p:nvGrpSpPr>
+        <p:cNvPr id="1" name=""/>
+        <p:cNvGrpSpPr/>
+        <p:nvPr/>
+      </p:nvGrpSpPr>
+      <p:grpSpPr>
+        <a:xfrm>
+          <a:off x="0" y="0"/>
+          <a:ext cx="0" cy="0"/>
+          <a:chOff x="0" y="0"/>
+          <a:chExt cx="0" cy="0"/>
+        </a:xfrm>
+      </p:grpSpPr>
+      <p:sp>
+        <p:nvSpPr>
+          <p:cNvPr id="2" name="Title 1"/>
+          <p:cNvSpPr>
+            <a:spLocks noGrp="1"/>
+          </p:cNvSpPr>
+          <p:nvPr>
+            <p:ph type="title"/>
+          </p:nvPr>
+        </p:nvSpPr>
+        <p:spPr/>
+        <p:txBody>
+          <a:bodyPr/>
+          <a:lstStyle/>
+          <a:p>
+            <a:r>
+              <a:rPr lang="en-US" dirty="0" smtClean="0"/>
+              <a:t>Why does this matter?</a:t>
+            </a:r>
+            <a:endParaRPr lang="en-US" dirty="0"/>
+          </a:p>
+        </p:txBody>
+      </p:sp>
+      <p:sp>
+        <p:nvSpPr>
+          <p:cNvPr id="4" name="Content Placeholder 3"/>
+          <p:cNvSpPr>
+            <a:spLocks noGrp="1"/>
+          </p:cNvSpPr>
+          <p:nvPr>
+            <p:ph sz="half" idx="2"/>
+          </p:nvPr>
+        </p:nvSpPr>
+        <p:spPr/>
+        <p:txBody>
+          <a:bodyPr/>
+          <a:lstStyle/>
+          <a:p>
+            <a:r>
+              <a:rPr lang="en-US" dirty="0"/>
+              <a:t>In attempting to improve the fit to this size comp because the strong seasonality in selectivity produces very large residuals, we are </a:t>
+            </a:r>
+            <a:r>
+              <a:rPr lang="en-US" dirty="0" smtClean="0"/>
+              <a:t>reducing the contribution of this fleet to the likelihood, therefore removing the information informing the upper bound of R0</a:t>
+            </a:r>
+            <a:endParaRPr lang="en-US" dirty="0"/>
+          </a:p>
+          <a:p>
+            <a:endParaRPr lang="en-US" dirty="0"/>
+          </a:p>
+        </p:txBody>
+      </p:sp>
+      <p:sp>
+        <p:nvSpPr>
+          <p:cNvPr id="6" name="Content Placeholder 5"/>
+          <p:cNvSpPr>
+            <a:spLocks noGrp="1"/>
+          </p:cNvSpPr>
+          <p:nvPr>
+            <p:ph sz="quarter" idx="4"/>
+          </p:nvPr>
+        </p:nvSpPr>
+        <p:spPr/>
+        <p:txBody>
+          <a:bodyPr/>
+          <a:lstStyle/>
+          <a:p>
+            <a:r>
+              <a:rPr lang="en-US" dirty="0" smtClean="0"/>
+              <a:t>Because of this, and because the stock is in good condition, catch is declines, CPUE is increasing (mostly), the model is able to fit the input data well at almost any value above the minimum (~7.2), and therefore unless constrained, will always hit the upper bound</a:t>
+            </a:r>
+            <a:endParaRPr lang="en-US" dirty="0"/>
+          </a:p>
+        </p:txBody>
+      </p:sp>
+      <p:sp>
+        <p:nvSpPr>
+          <p:cNvPr id="7" name="Text Placeholder 2"/>
+          <p:cNvSpPr>
+            <a:spLocks noGrp="1"/>
+          </p:cNvSpPr>
+          <p:nvPr>
+            <p:ph type="body" idx="1"/>
+          </p:nvPr>
+        </p:nvSpPr>
+        <p:spPr>
+          <a:xfrm>
+            <a:off x="1621536" y="4312111"/>
+            <a:ext cx="6187440" cy="479822"/>
+          </a:xfrm>
+        </p:spPr>
+        <p:txBody>
+          <a:bodyPr>
+            <a:noAutofit/>
+          </a:bodyPr>
+          <a:lstStyle/>
+          <a:p>
+            <a:r>
+              <a:rPr lang="en-US" sz="2000" dirty="0" smtClean="0"/>
+              <a:t>We have two (three?) basic choices to address this issue</a:t>
+            </a:r>
+            <a:endParaRPr lang="en-US" sz="2000" dirty="0"/>
+          </a:p>
+        </p:txBody>
+      </p:sp>
+    </p:spTree>
+    <p:extLst>
+      <p:ext uri="{BB962C8B-B14F-4D97-AF65-F5344CB8AC3E}">
+        <p14:creationId xmlns:p14="http://schemas.microsoft.com/office/powerpoint/2010/main" val="856175120"/>
+      </p:ext>
+    </p:extLst>
+  </p:cSld>
+  <p:clrMapOvr>
+    <a:masterClrMapping/>
+  </p:clrMapOvr>
+</p:sld>
+</file>
+
+<file path=ppt/slides/slide41.xml><?xml version="1.0" encoding="utf-8"?>
+<p:sld xmlns:a="http://schemas.openxmlformats.org/drawingml/2006/main" xmlns:r="http://schemas.openxmlformats.org/officeDocument/2006/relationships" xmlns:p="http://schemas.openxmlformats.org/presentationml/2006/main">
+  <p:cSld>
+    <p:spTree>
+      <p:nvGrpSpPr>
+        <p:cNvPr id="1" name=""/>
+        <p:cNvGrpSpPr/>
+        <p:nvPr/>
+      </p:nvGrpSpPr>
+      <p:grpSpPr>
+        <a:xfrm>
+          <a:off x="0" y="0"/>
+          <a:ext cx="0" cy="0"/>
+          <a:chOff x="0" y="0"/>
+          <a:chExt cx="0" cy="0"/>
+        </a:xfrm>
+      </p:grpSpPr>
+      <p:sp>
+        <p:nvSpPr>
+          <p:cNvPr id="2" name="Title 1"/>
+          <p:cNvSpPr>
+            <a:spLocks noGrp="1"/>
+          </p:cNvSpPr>
+          <p:nvPr>
+            <p:ph type="title"/>
+          </p:nvPr>
+        </p:nvSpPr>
+        <p:spPr/>
+        <p:txBody>
+          <a:bodyPr/>
+          <a:lstStyle/>
+          <a:p>
+            <a:r>
+              <a:rPr lang="en-US" dirty="0" smtClean="0"/>
+              <a:t>How do we fix this?</a:t>
+            </a:r>
+            <a:endParaRPr lang="en-US" dirty="0"/>
+          </a:p>
+        </p:txBody>
+      </p:sp>
+      <p:sp>
+        <p:nvSpPr>
+          <p:cNvPr id="4" name="Content Placeholder 3"/>
+          <p:cNvSpPr>
+            <a:spLocks noGrp="1"/>
+          </p:cNvSpPr>
+          <p:nvPr>
+            <p:ph sz="half" idx="2"/>
+          </p:nvPr>
+        </p:nvSpPr>
+        <p:spPr/>
+        <p:txBody>
+          <a:bodyPr>
+            <a:normAutofit lnSpcReduction="10000"/>
+          </a:bodyPr>
+          <a:lstStyle/>
+          <a:p>
+            <a:r>
+              <a:rPr lang="en-US" dirty="0" smtClean="0"/>
+              <a:t>Accept the poor fit to the US deep size data in the original model with the combined fleet</a:t>
+            </a:r>
+          </a:p>
+          <a:p>
+            <a:r>
+              <a:rPr lang="en-US" dirty="0" smtClean="0"/>
+              <a:t>We can explain why this poor fit exists</a:t>
+            </a:r>
+          </a:p>
+          <a:p>
+            <a:r>
+              <a:rPr lang="en-US" dirty="0" smtClean="0"/>
+              <a:t>We can attempt to </a:t>
+            </a:r>
+            <a:r>
+              <a:rPr lang="en-US" dirty="0" err="1" smtClean="0"/>
+              <a:t>downweight</a:t>
+            </a:r>
+            <a:r>
+              <a:rPr lang="en-US" dirty="0" smtClean="0"/>
+              <a:t> this fleet slightly, but acknowledge that it is a bycatch fleet and contributes a small amount of catch and it contains important information on recruitment </a:t>
+            </a:r>
+            <a:endParaRPr lang="en-US" dirty="0"/>
+          </a:p>
+        </p:txBody>
+      </p:sp>
+      <p:sp>
+        <p:nvSpPr>
+          <p:cNvPr id="6" name="Content Placeholder 5"/>
+          <p:cNvSpPr>
+            <a:spLocks noGrp="1"/>
+          </p:cNvSpPr>
+          <p:nvPr>
+            <p:ph sz="quarter" idx="4"/>
+          </p:nvPr>
+        </p:nvSpPr>
+        <p:spPr/>
+        <p:txBody>
+          <a:bodyPr>
+            <a:normAutofit fontScale="92500" lnSpcReduction="20000"/>
+          </a:bodyPr>
+          <a:lstStyle/>
+          <a:p>
+            <a:r>
+              <a:rPr lang="en-US" dirty="0" smtClean="0"/>
+              <a:t>OR we could move forward with the split US deep size comps, and put a reasonably strong prior on R0</a:t>
+            </a:r>
+          </a:p>
+          <a:p>
+            <a:pPr lvl="1"/>
+            <a:r>
+              <a:rPr lang="en-US" dirty="0" smtClean="0"/>
+              <a:t>One option is to use the R0 from the combined size data model</a:t>
+            </a:r>
+          </a:p>
+          <a:p>
+            <a:pPr lvl="1"/>
+            <a:r>
+              <a:rPr lang="en-US" dirty="0" smtClean="0"/>
+              <a:t>But this makes a very strong assumption about R0 and should not be undertaken lightly.</a:t>
+            </a:r>
+          </a:p>
+          <a:p>
+            <a:r>
+              <a:rPr lang="en-US" dirty="0" smtClean="0"/>
+              <a:t>The current model has a prior on R0, but still has very high result – decreasing the CV to 0.01 gives results fairly consistent with the combined model, but is a very strong prior</a:t>
+            </a:r>
+            <a:endParaRPr lang="en-US" dirty="0"/>
+          </a:p>
+        </p:txBody>
+      </p:sp>
+      <p:sp>
+        <p:nvSpPr>
+          <p:cNvPr id="7" name="Text Placeholder 6"/>
+          <p:cNvSpPr>
+            <a:spLocks noGrp="1"/>
+          </p:cNvSpPr>
+          <p:nvPr>
+            <p:ph type="body" idx="1"/>
+          </p:nvPr>
+        </p:nvSpPr>
+        <p:spPr>
+          <a:xfrm>
+            <a:off x="1450848" y="4455367"/>
+            <a:ext cx="6751320" cy="479822"/>
+          </a:xfrm>
+        </p:spPr>
+        <p:txBody>
+          <a:bodyPr>
+            <a:noAutofit/>
+          </a:bodyPr>
+          <a:lstStyle/>
+          <a:p>
+            <a:r>
+              <a:rPr lang="en-US" sz="1200" dirty="0" smtClean="0"/>
+              <a:t>Or we could drop this size data all together and see what happens (we did this in the 2018 assessment).</a:t>
+            </a:r>
+            <a:endParaRPr lang="en-US" sz="1200" dirty="0"/>
+          </a:p>
+        </p:txBody>
+      </p:sp>
+    </p:spTree>
+    <p:extLst>
+      <p:ext uri="{BB962C8B-B14F-4D97-AF65-F5344CB8AC3E}">
+        <p14:creationId xmlns:p14="http://schemas.microsoft.com/office/powerpoint/2010/main" val="1109338796"/>
+      </p:ext>
+    </p:extLst>
+  </p:cSld>
+  <p:clrMapOvr>
+    <a:masterClrMapping/>
+  </p:clrMapOvr>
 </p:sld>
 </file>
 

</xml_diff>

<commit_message>
April 13 model runs
</commit_message>
<xml_diff>
--- a/Sculley_AssessmentPres.pptx
+++ b/Sculley_AssessmentPres.pptx
@@ -42,10 +42,10 @@
     <p:sldId id="292" r:id="rId36"/>
     <p:sldId id="293" r:id="rId37"/>
     <p:sldId id="300" r:id="rId38"/>
-    <p:sldId id="301" r:id="rId39"/>
-    <p:sldId id="302" r:id="rId40"/>
-    <p:sldId id="303" r:id="rId41"/>
-    <p:sldId id="304" r:id="rId42"/>
+    <p:sldId id="302" r:id="rId39"/>
+    <p:sldId id="303" r:id="rId40"/>
+    <p:sldId id="304" r:id="rId41"/>
+    <p:sldId id="305" r:id="rId42"/>
   </p:sldIdLst>
   <p:sldSz cx="9144000" cy="5143500" type="screen16x9"/>
   <p:notesSz cx="6858000" cy="9144000"/>
@@ -7139,7 +7139,7 @@
           <a:p>
             <a:r>
               <a:rPr lang="en-US" dirty="0" smtClean="0"/>
-              <a:t>Results</a:t>
+              <a:t>What’s happening</a:t>
             </a:r>
             <a:endParaRPr lang="en-US" dirty="0"/>
           </a:p>
@@ -7152,26 +7152,191 @@
             <a:spLocks noGrp="1"/>
           </p:cNvSpPr>
           <p:nvPr>
-            <p:ph idx="1"/>
+            <p:ph type="body" idx="1"/>
           </p:nvPr>
         </p:nvSpPr>
         <p:spPr/>
         <p:txBody>
-          <a:bodyPr/>
+          <a:bodyPr>
+            <a:normAutofit fontScale="62500" lnSpcReduction="20000"/>
+          </a:bodyPr>
           <a:lstStyle/>
           <a:p>
             <a:r>
               <a:rPr lang="en-US" dirty="0" smtClean="0"/>
-              <a:t>R0 estimate is 11</a:t>
+              <a:t>The likelihood profile for the model with a single US deep size comp fleet has a very flat likelihood above the MLE estimate of R0</a:t>
             </a:r>
             <a:endParaRPr lang="en-US" dirty="0"/>
+          </a:p>
+        </p:txBody>
+      </p:sp>
+      <p:sp>
+        <p:nvSpPr>
+          <p:cNvPr id="6" name="Text Placeholder 5"/>
+          <p:cNvSpPr>
+            <a:spLocks noGrp="1"/>
+          </p:cNvSpPr>
+          <p:nvPr>
+            <p:ph type="body" sz="quarter" idx="3"/>
+          </p:nvPr>
+        </p:nvSpPr>
+        <p:spPr/>
+        <p:txBody>
+          <a:bodyPr>
+            <a:normAutofit fontScale="55000" lnSpcReduction="20000"/>
+          </a:bodyPr>
+          <a:lstStyle/>
+          <a:p>
+            <a:r>
+              <a:rPr lang="en-US" dirty="0" smtClean="0"/>
+              <a:t>Of the information available to inform the upper bound of R0 – most of it comes from the US deep size data, it is the largest contributor to the likelihood.</a:t>
+            </a:r>
+            <a:endParaRPr lang="en-US" dirty="0"/>
+          </a:p>
+        </p:txBody>
+      </p:sp>
+      <p:pic>
+        <p:nvPicPr>
+          <p:cNvPr id="8" name="Content Placeholder 7" descr="fig:  ModelDev/Current%20Best/plots/Overall_Likelihood.png"/>
+          <p:cNvPicPr>
+            <a:picLocks noGrp="1" noChangeAspect="1"/>
+          </p:cNvPicPr>
+          <p:nvPr>
+            <p:ph sz="half" idx="2"/>
+          </p:nvPr>
+        </p:nvPicPr>
+        <p:blipFill>
+          <a:blip r:embed="rId2"/>
+          <a:stretch>
+            <a:fillRect/>
+          </a:stretch>
+        </p:blipFill>
+        <p:spPr bwMode="auto">
+          <a:xfrm>
+            <a:off x="861251" y="1600391"/>
+            <a:ext cx="2963862" cy="2963862"/>
+          </a:xfrm>
+          <a:prstGeom prst="rect">
+            <a:avLst/>
+          </a:prstGeom>
+          <a:noFill/>
+          <a:ln w="9525">
+            <a:noFill/>
+            <a:headEnd/>
+            <a:tailEnd/>
+          </a:ln>
+        </p:spPr>
+      </p:pic>
+      <p:pic>
+        <p:nvPicPr>
+          <p:cNvPr id="9" name="Content Placeholder 8" descr="fig:  ModelDev/Current%20Best/plots/Size_Likelihood.png"/>
+          <p:cNvPicPr>
+            <a:picLocks noGrp="1" noChangeAspect="1"/>
+          </p:cNvPicPr>
+          <p:nvPr>
+            <p:ph sz="quarter" idx="4"/>
+          </p:nvPr>
+        </p:nvPicPr>
+        <p:blipFill>
+          <a:blip r:embed="rId3"/>
+          <a:stretch>
+            <a:fillRect/>
+          </a:stretch>
+        </p:blipFill>
+        <p:spPr bwMode="auto">
+          <a:xfrm>
+            <a:off x="4497388" y="1643349"/>
+            <a:ext cx="2963862" cy="2963862"/>
+          </a:xfrm>
+          <a:prstGeom prst="rect">
+            <a:avLst/>
+          </a:prstGeom>
+          <a:noFill/>
+          <a:ln w="9525">
+            <a:noFill/>
+            <a:headEnd/>
+            <a:tailEnd/>
+          </a:ln>
+        </p:spPr>
+      </p:pic>
+      <p:sp>
+        <p:nvSpPr>
+          <p:cNvPr id="10" name="Rectangle 9"/>
+          <p:cNvSpPr/>
+          <p:nvPr/>
+        </p:nvSpPr>
+        <p:spPr>
+          <a:xfrm>
+            <a:off x="5992199" y="3797808"/>
+            <a:ext cx="1243584" cy="326136"/>
+          </a:xfrm>
+          <a:prstGeom prst="rect">
+            <a:avLst/>
+          </a:prstGeom>
+          <a:noFill/>
+          <a:ln w="19050">
+            <a:solidFill>
+              <a:srgbClr val="C00000"/>
+            </a:solidFill>
+          </a:ln>
+        </p:spPr>
+        <p:style>
+          <a:lnRef idx="1">
+            <a:schemeClr val="accent1"/>
+          </a:lnRef>
+          <a:fillRef idx="3">
+            <a:schemeClr val="accent1"/>
+          </a:fillRef>
+          <a:effectRef idx="2">
+            <a:schemeClr val="accent1"/>
+          </a:effectRef>
+          <a:fontRef idx="minor">
+            <a:schemeClr val="lt1"/>
+          </a:fontRef>
+        </p:style>
+        <p:txBody>
+          <a:bodyPr rtlCol="0" anchor="ctr"/>
+          <a:lstStyle/>
+          <a:p>
+            <a:pPr algn="ctr"/>
+            <a:endParaRPr lang="en-US"/>
+          </a:p>
+        </p:txBody>
+      </p:sp>
+      <p:sp>
+        <p:nvSpPr>
+          <p:cNvPr id="11" name="TextBox 10"/>
+          <p:cNvSpPr txBox="1"/>
+          <p:nvPr/>
+        </p:nvSpPr>
+        <p:spPr>
+          <a:xfrm>
+            <a:off x="7306614" y="2507087"/>
+            <a:ext cx="1751528" cy="830997"/>
+          </a:xfrm>
+          <a:prstGeom prst="rect">
+            <a:avLst/>
+          </a:prstGeom>
+          <a:noFill/>
+        </p:spPr>
+        <p:txBody>
+          <a:bodyPr wrap="square" rtlCol="0">
+            <a:spAutoFit/>
+          </a:bodyPr>
+          <a:lstStyle/>
+          <a:p>
+            <a:r>
+              <a:rPr lang="en-US" sz="1200" dirty="0" smtClean="0"/>
+              <a:t>The change in likelihood overall is 2.87, of this 2.39 is from the F9 size data</a:t>
+            </a:r>
+            <a:endParaRPr lang="en-US" sz="1200" dirty="0"/>
           </a:p>
         </p:txBody>
       </p:sp>
     </p:spTree>
     <p:extLst>
       <p:ext uri="{BB962C8B-B14F-4D97-AF65-F5344CB8AC3E}">
-        <p14:creationId xmlns:p14="http://schemas.microsoft.com/office/powerpoint/2010/main" val="2727909969"/>
+        <p14:creationId xmlns:p14="http://schemas.microsoft.com/office/powerpoint/2010/main" val="1663573916"/>
       </p:ext>
     </p:extLst>
   </p:cSld>
@@ -7215,7 +7380,7 @@
           <a:p>
             <a:r>
               <a:rPr lang="en-US" dirty="0" smtClean="0"/>
-              <a:t>What’s happening</a:t>
+              <a:t>Why does this matter?</a:t>
             </a:r>
             <a:endParaRPr lang="en-US" dirty="0"/>
           </a:p>
@@ -7223,7 +7388,60 @@
       </p:sp>
       <p:sp>
         <p:nvSpPr>
-          <p:cNvPr id="3" name="Content Placeholder 2"/>
+          <p:cNvPr id="4" name="Content Placeholder 3"/>
+          <p:cNvSpPr>
+            <a:spLocks noGrp="1"/>
+          </p:cNvSpPr>
+          <p:nvPr>
+            <p:ph sz="half" idx="2"/>
+          </p:nvPr>
+        </p:nvSpPr>
+        <p:spPr/>
+        <p:txBody>
+          <a:bodyPr/>
+          <a:lstStyle/>
+          <a:p>
+            <a:r>
+              <a:rPr lang="en-US" dirty="0"/>
+              <a:t>In attempting to improve the fit to this size comp because the strong seasonality in selectivity produces very large residuals, we are </a:t>
+            </a:r>
+            <a:r>
+              <a:rPr lang="en-US" dirty="0" smtClean="0"/>
+              <a:t>reducing the contribution of this fleet to the likelihood, therefore removing the information informing the upper bound of R0</a:t>
+            </a:r>
+            <a:endParaRPr lang="en-US" dirty="0"/>
+          </a:p>
+          <a:p>
+            <a:endParaRPr lang="en-US" dirty="0"/>
+          </a:p>
+        </p:txBody>
+      </p:sp>
+      <p:sp>
+        <p:nvSpPr>
+          <p:cNvPr id="6" name="Content Placeholder 5"/>
+          <p:cNvSpPr>
+            <a:spLocks noGrp="1"/>
+          </p:cNvSpPr>
+          <p:nvPr>
+            <p:ph sz="quarter" idx="4"/>
+          </p:nvPr>
+        </p:nvSpPr>
+        <p:spPr/>
+        <p:txBody>
+          <a:bodyPr/>
+          <a:lstStyle/>
+          <a:p>
+            <a:r>
+              <a:rPr lang="en-US" dirty="0" smtClean="0"/>
+              <a:t>Because of this, and because the stock is in good condition, catch is declines, CPUE is increasing (mostly), the model is able to fit the input data well at almost any value above the minimum (~7.2), and therefore unless constrained, will always hit the upper bound</a:t>
+            </a:r>
+            <a:endParaRPr lang="en-US" dirty="0"/>
+          </a:p>
+        </p:txBody>
+      </p:sp>
+      <p:sp>
+        <p:nvSpPr>
+          <p:cNvPr id="7" name="Text Placeholder 2"/>
           <p:cNvSpPr>
             <a:spLocks noGrp="1"/>
           </p:cNvSpPr>
@@ -7231,158 +7449,30 @@
             <p:ph type="body" idx="1"/>
           </p:nvPr>
         </p:nvSpPr>
-        <p:spPr/>
+        <p:spPr>
+          <a:xfrm>
+            <a:off x="1621536" y="4312111"/>
+            <a:ext cx="6187440" cy="479822"/>
+          </a:xfrm>
+        </p:spPr>
         <p:txBody>
           <a:bodyPr>
-            <a:normAutofit fontScale="62500" lnSpcReduction="20000"/>
+            <a:noAutofit/>
           </a:bodyPr>
           <a:lstStyle/>
           <a:p>
             <a:r>
-              <a:rPr lang="en-US" dirty="0" smtClean="0"/>
-              <a:t>The likelihood profile for the model with a single US deep size comp fleet has a very flat likelihood above the MLE estimate of R0</a:t>
-            </a:r>
-            <a:endParaRPr lang="en-US" dirty="0"/>
-          </a:p>
-        </p:txBody>
-      </p:sp>
-      <p:sp>
-        <p:nvSpPr>
-          <p:cNvPr id="6" name="Text Placeholder 5"/>
-          <p:cNvSpPr>
-            <a:spLocks noGrp="1"/>
-          </p:cNvSpPr>
-          <p:nvPr>
-            <p:ph type="body" sz="quarter" idx="3"/>
-          </p:nvPr>
-        </p:nvSpPr>
-        <p:spPr/>
-        <p:txBody>
-          <a:bodyPr>
-            <a:normAutofit fontScale="55000" lnSpcReduction="20000"/>
-          </a:bodyPr>
-          <a:lstStyle/>
-          <a:p>
-            <a:r>
-              <a:rPr lang="en-US" dirty="0" smtClean="0"/>
-              <a:t>Of the information available to inform the upper bound of R0 – most of it comes from the US deep size data, it is the largest contributor to the likelihood.</a:t>
-            </a:r>
-            <a:endParaRPr lang="en-US" dirty="0"/>
-          </a:p>
-        </p:txBody>
-      </p:sp>
-      <p:pic>
-        <p:nvPicPr>
-          <p:cNvPr id="8" name="Content Placeholder 7" descr="fig:  ModelDev/Current%20Best/plots/Overall_Likelihood.png"/>
-          <p:cNvPicPr>
-            <a:picLocks noGrp="1" noChangeAspect="1"/>
-          </p:cNvPicPr>
-          <p:nvPr>
-            <p:ph sz="half" idx="2"/>
-          </p:nvPr>
-        </p:nvPicPr>
-        <p:blipFill>
-          <a:blip r:embed="rId2"/>
-          <a:stretch>
-            <a:fillRect/>
-          </a:stretch>
-        </p:blipFill>
-        <p:spPr bwMode="auto">
-          <a:xfrm>
-            <a:off x="861251" y="1600391"/>
-            <a:ext cx="2963862" cy="2963862"/>
-          </a:xfrm>
-          <a:prstGeom prst="rect">
-            <a:avLst/>
-          </a:prstGeom>
-          <a:noFill/>
-          <a:ln w="9525">
-            <a:noFill/>
-            <a:headEnd/>
-            <a:tailEnd/>
-          </a:ln>
-        </p:spPr>
-      </p:pic>
-      <p:pic>
-        <p:nvPicPr>
-          <p:cNvPr id="9" name="Content Placeholder 8" descr="fig:  ModelDev/Current%20Best/plots/Size_Likelihood.png"/>
-          <p:cNvPicPr>
-            <a:picLocks noGrp="1" noChangeAspect="1"/>
-          </p:cNvPicPr>
-          <p:nvPr>
-            <p:ph sz="quarter" idx="4"/>
-          </p:nvPr>
-        </p:nvPicPr>
-        <p:blipFill>
-          <a:blip r:embed="rId3"/>
-          <a:stretch>
-            <a:fillRect/>
-          </a:stretch>
-        </p:blipFill>
-        <p:spPr bwMode="auto">
-          <a:xfrm>
-            <a:off x="5183982" y="1643349"/>
-            <a:ext cx="2963862" cy="2963862"/>
-          </a:xfrm>
-          <a:prstGeom prst="rect">
-            <a:avLst/>
-          </a:prstGeom>
-          <a:noFill/>
-          <a:ln w="9525">
-            <a:noFill/>
-            <a:headEnd/>
-            <a:tailEnd/>
-          </a:ln>
-        </p:spPr>
-      </p:pic>
-      <p:sp>
-        <p:nvSpPr>
-          <p:cNvPr id="10" name="Rectangle 9"/>
-          <p:cNvSpPr/>
-          <p:nvPr/>
-        </p:nvSpPr>
-        <p:spPr>
-          <a:xfrm>
-            <a:off x="6720840" y="3797808"/>
-            <a:ext cx="1243584" cy="326136"/>
-          </a:xfrm>
-          <a:prstGeom prst="rect">
-            <a:avLst/>
-          </a:prstGeom>
-          <a:noFill/>
-          <a:ln w="19050">
-            <a:solidFill>
-              <a:srgbClr val="C00000"/>
-            </a:solidFill>
-          </a:ln>
-        </p:spPr>
-        <p:style>
-          <a:lnRef idx="1">
-            <a:schemeClr val="accent1"/>
-          </a:lnRef>
-          <a:fillRef idx="3">
-            <a:schemeClr val="accent1"/>
-          </a:fillRef>
-          <a:effectRef idx="2">
-            <a:schemeClr val="accent1"/>
-          </a:effectRef>
-          <a:fontRef idx="minor">
-            <a:schemeClr val="lt1"/>
-          </a:fontRef>
-        </p:style>
-        <p:txBody>
-          <a:bodyPr rtlCol="0" anchor="ctr"/>
-          <a:lstStyle/>
-          <a:p>
-            <a:pPr algn="ctr"/>
-            <a:endParaRPr lang="en-US"/>
+              <a:rPr lang="en-US" sz="2000" dirty="0" smtClean="0"/>
+              <a:t>We have two (three?) basic choices to address this issue</a:t>
+            </a:r>
+            <a:endParaRPr lang="en-US" sz="2000" dirty="0"/>
           </a:p>
         </p:txBody>
       </p:sp>
     </p:spTree>
     <p:extLst>
       <p:ext uri="{BB962C8B-B14F-4D97-AF65-F5344CB8AC3E}">
-        <p14:creationId xmlns:p14="http://schemas.microsoft.com/office/powerpoint/2010/main" val="1663573916"/>
+        <p14:creationId xmlns:p14="http://schemas.microsoft.com/office/powerpoint/2010/main" val="856175120"/>
       </p:ext>
     </p:extLst>
   </p:cSld>
@@ -7518,7 +7608,7 @@
           <a:p>
             <a:r>
               <a:rPr lang="en-US" dirty="0" smtClean="0"/>
-              <a:t>Why does this matter?</a:t>
+              <a:t>How do we fix this?</a:t>
             </a:r>
             <a:endParaRPr lang="en-US" dirty="0"/>
           </a:p>
@@ -7536,20 +7626,35 @@
         </p:nvSpPr>
         <p:spPr/>
         <p:txBody>
-          <a:bodyPr/>
-          <a:lstStyle/>
-          <a:p>
-            <a:r>
-              <a:rPr lang="en-US" dirty="0"/>
-              <a:t>In attempting to improve the fit to this size comp because the strong seasonality in selectivity produces very large residuals, we are </a:t>
-            </a:r>
+          <a:bodyPr>
+            <a:normAutofit lnSpcReduction="10000"/>
+          </a:bodyPr>
+          <a:lstStyle/>
+          <a:p>
             <a:r>
               <a:rPr lang="en-US" dirty="0" smtClean="0"/>
-              <a:t>reducing the contribution of this fleet to the likelihood, therefore removing the information informing the upper bound of R0</a:t>
-            </a:r>
-            <a:endParaRPr lang="en-US" dirty="0"/>
-          </a:p>
-          <a:p>
+              <a:t>Accept the poor fit to the US deep size data in the original model with the combined fleet</a:t>
+            </a:r>
+          </a:p>
+          <a:p>
+            <a:r>
+              <a:rPr lang="en-US" dirty="0" smtClean="0"/>
+              <a:t>We can explain why this poor fit exists</a:t>
+            </a:r>
+          </a:p>
+          <a:p>
+            <a:r>
+              <a:rPr lang="en-US" dirty="0" smtClean="0"/>
+              <a:t>We can attempt to </a:t>
+            </a:r>
+            <a:r>
+              <a:rPr lang="en-US" dirty="0" err="1" smtClean="0"/>
+              <a:t>downweight</a:t>
+            </a:r>
+            <a:r>
+              <a:rPr lang="en-US" dirty="0" smtClean="0"/>
+              <a:t> this fleet slightly, but acknowledge that it is a bycatch fleet and contributes a small amount of catch and it contains important information on recruitment </a:t>
+            </a:r>
             <a:endParaRPr lang="en-US" dirty="0"/>
           </a:p>
         </p:txBody>
@@ -7566,12 +7671,34 @@
         </p:nvSpPr>
         <p:spPr/>
         <p:txBody>
-          <a:bodyPr/>
+          <a:bodyPr>
+            <a:normAutofit fontScale="92500" lnSpcReduction="20000"/>
+          </a:bodyPr>
           <a:lstStyle/>
           <a:p>
             <a:r>
               <a:rPr lang="en-US" dirty="0" smtClean="0"/>
-              <a:t>Because of this, and because the stock is in good condition, catch is declines, CPUE is increasing (mostly), the model is able to fit the input data well at almost any value above the minimum (~7.2), and therefore unless constrained, will always hit the upper bound</a:t>
+              <a:t>OR we could move forward with the split US deep size comps, and put a reasonably strong prior on R0</a:t>
+            </a:r>
+          </a:p>
+          <a:p>
+            <a:pPr lvl="1"/>
+            <a:r>
+              <a:rPr lang="en-US" dirty="0" smtClean="0"/>
+              <a:t>One option is to use the R0 from the combined size data model</a:t>
+            </a:r>
+          </a:p>
+          <a:p>
+            <a:pPr lvl="1"/>
+            <a:r>
+              <a:rPr lang="en-US" dirty="0" smtClean="0"/>
+              <a:t>But this makes a very strong assumption about R0 and should not be undertaken lightly.</a:t>
+            </a:r>
+          </a:p>
+          <a:p>
+            <a:r>
+              <a:rPr lang="en-US" dirty="0" smtClean="0"/>
+              <a:t>The current model has a prior on R0, but still has very high result – decreasing the CV to 0.01 gives results fairly consistent with the combined model, but is a very strong prior</a:t>
             </a:r>
             <a:endParaRPr lang="en-US" dirty="0"/>
           </a:p>
@@ -7579,7 +7706,7 @@
       </p:sp>
       <p:sp>
         <p:nvSpPr>
-          <p:cNvPr id="7" name="Text Placeholder 2"/>
+          <p:cNvPr id="7" name="Text Placeholder 6"/>
           <p:cNvSpPr>
             <a:spLocks noGrp="1"/>
           </p:cNvSpPr>
@@ -7589,8 +7716,8 @@
         </p:nvSpPr>
         <p:spPr>
           <a:xfrm>
-            <a:off x="1621536" y="4312111"/>
-            <a:ext cx="6187440" cy="479822"/>
+            <a:off x="1450848" y="4455367"/>
+            <a:ext cx="6751320" cy="479822"/>
           </a:xfrm>
         </p:spPr>
         <p:txBody>
@@ -7600,17 +7727,17 @@
           <a:lstStyle/>
           <a:p>
             <a:r>
-              <a:rPr lang="en-US" sz="2000" dirty="0" smtClean="0"/>
-              <a:t>We have two (three?) basic choices to address this issue</a:t>
-            </a:r>
-            <a:endParaRPr lang="en-US" sz="2000" dirty="0"/>
+              <a:rPr lang="en-US" sz="1200" dirty="0" smtClean="0"/>
+              <a:t>Or we could drop this size data all together and see what happens (we did this in the 2018 assessment).</a:t>
+            </a:r>
+            <a:endParaRPr lang="en-US" sz="1200" dirty="0"/>
           </a:p>
         </p:txBody>
       </p:sp>
     </p:spTree>
     <p:extLst>
       <p:ext uri="{BB962C8B-B14F-4D97-AF65-F5344CB8AC3E}">
-        <p14:creationId xmlns:p14="http://schemas.microsoft.com/office/powerpoint/2010/main" val="856175120"/>
+        <p14:creationId xmlns:p14="http://schemas.microsoft.com/office/powerpoint/2010/main" val="1109338796"/>
       </p:ext>
     </p:extLst>
   </p:cSld>
@@ -7639,7 +7766,7 @@
       </p:grpSpPr>
       <p:sp>
         <p:nvSpPr>
-          <p:cNvPr id="2" name="Title 1"/>
+          <p:cNvPr id="7" name="Title 6"/>
           <p:cNvSpPr>
             <a:spLocks noGrp="1"/>
           </p:cNvSpPr>
@@ -7652,138 +7779,193 @@
           <a:bodyPr/>
           <a:lstStyle/>
           <a:p>
-            <a:r>
-              <a:rPr lang="en-US" dirty="0" smtClean="0"/>
-              <a:t>How do we fix this?</a:t>
-            </a:r>
-            <a:endParaRPr lang="en-US" dirty="0"/>
-          </a:p>
-        </p:txBody>
-      </p:sp>
-      <p:sp>
-        <p:nvSpPr>
-          <p:cNvPr id="4" name="Content Placeholder 3"/>
+            <a:endParaRPr lang="en-US"/>
+          </a:p>
+        </p:txBody>
+      </p:sp>
+      <p:sp>
+        <p:nvSpPr>
+          <p:cNvPr id="8" name="Content Placeholder 7"/>
           <p:cNvSpPr>
             <a:spLocks noGrp="1"/>
           </p:cNvSpPr>
           <p:nvPr>
-            <p:ph sz="half" idx="2"/>
+            <p:ph idx="1"/>
           </p:nvPr>
         </p:nvSpPr>
         <p:spPr/>
         <p:txBody>
           <a:bodyPr>
-            <a:normAutofit lnSpcReduction="10000"/>
+            <a:normAutofit fontScale="70000" lnSpcReduction="20000"/>
           </a:bodyPr>
           <a:lstStyle/>
           <a:p>
             <a:r>
               <a:rPr lang="en-US" dirty="0" smtClean="0"/>
-              <a:t>Accept the poor fit to the US deep size data in the original model with the combined fleet</a:t>
-            </a:r>
-          </a:p>
-          <a:p>
+              <a:t>3_both </a:t>
+            </a:r>
+            <a:r>
+              <a:rPr lang="en-US" dirty="0"/>
+              <a:t>1 and </a:t>
+            </a:r>
             <a:r>
               <a:rPr lang="en-US" dirty="0" smtClean="0"/>
-              <a:t>We can explain why this poor fit exists</a:t>
-            </a:r>
-          </a:p>
-          <a:p>
+              <a:t>2</a:t>
+            </a:r>
+            <a:r>
+              <a:rPr lang="en-US" dirty="0"/>
+              <a:t> </a:t>
+            </a:r>
             <a:r>
               <a:rPr lang="en-US" dirty="0" smtClean="0"/>
-              <a:t>We can attempt to </a:t>
+              <a:t>– starting point</a:t>
+            </a:r>
+            <a:endParaRPr lang="en-US" dirty="0"/>
+          </a:p>
+          <a:p>
+            <a:r>
+              <a:rPr lang="en-US" dirty="0" smtClean="0">
+                <a:hlinkClick r:id="rId2" action="ppaction://hlinkfile"/>
+              </a:rPr>
+              <a:t>4_drop S4 and S8, split F9, </a:t>
+            </a:r>
+            <a:r>
+              <a:rPr lang="en-US" smtClean="0">
+                <a:hlinkClick r:id="rId2" action="ppaction://hlinkfile"/>
+              </a:rPr>
+              <a:t>change Amin to 0.5 (80cm)</a:t>
+            </a:r>
+            <a:r>
+              <a:rPr lang="en-US" smtClean="0"/>
+              <a:t> </a:t>
+            </a:r>
+            <a:r>
+              <a:rPr lang="en-US" dirty="0" smtClean="0"/>
+              <a:t>and lognormal selectivity on TWN and IATTC</a:t>
+            </a:r>
+          </a:p>
+          <a:p>
+            <a:pPr lvl="1"/>
+            <a:r>
+              <a:rPr lang="en-US" dirty="0" smtClean="0"/>
+              <a:t>Size comp fit improve, converges, very large R0</a:t>
+            </a:r>
+            <a:endParaRPr lang="en-US" dirty="0"/>
+          </a:p>
+          <a:p>
+            <a:r>
+              <a:rPr lang="en-US" dirty="0" smtClean="0">
+                <a:hlinkClick r:id="rId2" action="ppaction://hlinkfile"/>
+              </a:rPr>
+              <a:t>5_change </a:t>
+            </a:r>
+            <a:r>
+              <a:rPr lang="en-US" dirty="0">
+                <a:hlinkClick r:id="rId2" action="ppaction://hlinkfile"/>
+              </a:rPr>
+              <a:t>settlement </a:t>
+            </a:r>
+            <a:r>
+              <a:rPr lang="en-US" dirty="0" smtClean="0">
+                <a:hlinkClick r:id="rId2" action="ppaction://hlinkfile"/>
+              </a:rPr>
+              <a:t>month</a:t>
+            </a:r>
+            <a:endParaRPr lang="en-US" dirty="0" smtClean="0"/>
+          </a:p>
+          <a:p>
+            <a:pPr lvl="1"/>
+            <a:r>
+              <a:rPr lang="en-US" dirty="0" smtClean="0"/>
+              <a:t>Doesn’t converge (no hessian) R0 very large, improves fit to quarter 3 F9 data, not q1-2 F9 data</a:t>
+            </a:r>
+            <a:endParaRPr lang="en-US" dirty="0"/>
+          </a:p>
+          <a:p>
+            <a:r>
+              <a:rPr lang="en-US" dirty="0" smtClean="0"/>
+              <a:t>6_increase </a:t>
+            </a:r>
+            <a:r>
+              <a:rPr lang="en-US" dirty="0"/>
+              <a:t>CV </a:t>
             </a:r>
             <a:r>
               <a:rPr lang="en-US" dirty="0" err="1" smtClean="0"/>
-              <a:t>downweight</a:t>
-            </a:r>
+              <a:t>Lmin</a:t>
+            </a:r>
+            <a:endParaRPr lang="en-US" dirty="0" smtClean="0"/>
+          </a:p>
+          <a:p>
+            <a:pPr lvl="1"/>
             <a:r>
               <a:rPr lang="en-US" dirty="0" smtClean="0"/>
-              <a:t> this fleet slightly, but acknowledge that it is a bycatch fleet and contributes a small amount of catch and it contains important information on recruitment </a:t>
+              <a:t>Doesn’t converge (no hessian), R0 very large, improves size comp fit</a:t>
             </a:r>
             <a:endParaRPr lang="en-US" dirty="0"/>
           </a:p>
-        </p:txBody>
-      </p:sp>
-      <p:sp>
-        <p:nvSpPr>
-          <p:cNvPr id="6" name="Content Placeholder 5"/>
-          <p:cNvSpPr>
-            <a:spLocks noGrp="1"/>
-          </p:cNvSpPr>
-          <p:nvPr>
-            <p:ph sz="quarter" idx="4"/>
-          </p:nvPr>
-        </p:nvSpPr>
-        <p:spPr/>
-        <p:txBody>
-          <a:bodyPr>
-            <a:normAutofit fontScale="92500" lnSpcReduction="20000"/>
-          </a:bodyPr>
-          <a:lstStyle/>
-          <a:p>
+          <a:p>
+            <a:r>
+              <a:rPr lang="en-US" dirty="0" smtClean="0">
+                <a:hlinkClick r:id="rId3" action="ppaction://hlinkfile"/>
+              </a:rPr>
+              <a:t>7_lognormal </a:t>
+            </a:r>
+            <a:r>
+              <a:rPr lang="en-US" dirty="0" err="1" smtClean="0">
+                <a:hlinkClick r:id="rId3" action="ppaction://hlinkfile"/>
+              </a:rPr>
+              <a:t>selec</a:t>
+            </a:r>
+            <a:r>
+              <a:rPr lang="en-US" dirty="0" smtClean="0">
+                <a:hlinkClick r:id="rId3" action="ppaction://hlinkfile"/>
+              </a:rPr>
+              <a:t>, split F9, drop S4 and S8 </a:t>
+            </a:r>
+            <a:endParaRPr lang="en-US" dirty="0"/>
+          </a:p>
+          <a:p>
+            <a:r>
+              <a:rPr lang="en-US" dirty="0" smtClean="0">
+                <a:hlinkClick r:id="rId4" action="ppaction://hlinkfile"/>
+              </a:rPr>
+              <a:t>8_lognormal selectivity, F9 one fleet, change </a:t>
+            </a:r>
             <a:r>
               <a:rPr lang="en-US" dirty="0" smtClean="0"/>
-              <a:t>OR we could move forward with the split US deep size comps, and put a reasonably strong prior on R0</a:t>
-            </a:r>
-          </a:p>
-          <a:p>
-            <a:pPr lvl="1"/>
+              <a:t>Amin to 0.5</a:t>
+            </a:r>
+            <a:endParaRPr lang="en-US" dirty="0"/>
+          </a:p>
+          <a:p>
             <a:r>
               <a:rPr lang="en-US" dirty="0" smtClean="0"/>
-              <a:t>One option is to use the R0 from the combined size data model</a:t>
-            </a:r>
-          </a:p>
-          <a:p>
-            <a:pPr lvl="1"/>
+              <a:t>9_drop S4 and S8, split F9, lognormal selectivity</a:t>
+            </a:r>
+            <a:endParaRPr lang="en-US" dirty="0"/>
+          </a:p>
+          <a:p>
             <a:r>
               <a:rPr lang="en-US" dirty="0" smtClean="0"/>
-              <a:t>But this makes a very strong assumption about R0 and should not be undertaken lightly.</a:t>
-            </a:r>
-          </a:p>
-          <a:p>
+              <a:t>10_Split F9, Drop S4 and S8, change Amin to 0.5, increase </a:t>
+            </a:r>
+            <a:r>
+              <a:rPr lang="en-US" dirty="0" err="1" smtClean="0"/>
+              <a:t>Lmin</a:t>
+            </a:r>
             <a:r>
               <a:rPr lang="en-US" dirty="0" smtClean="0"/>
-              <a:t>The current model has a prior on R0, but still has very high result – decreasing the CV to 0.01 gives results fairly consistent with the combined model, but is a very strong prior</a:t>
+              <a:t> CV, lognormal selectivity</a:t>
             </a:r>
             <a:endParaRPr lang="en-US" dirty="0"/>
-          </a:p>
-        </p:txBody>
-      </p:sp>
-      <p:sp>
-        <p:nvSpPr>
-          <p:cNvPr id="7" name="Text Placeholder 6"/>
-          <p:cNvSpPr>
-            <a:spLocks noGrp="1"/>
-          </p:cNvSpPr>
-          <p:nvPr>
-            <p:ph type="body" idx="1"/>
-          </p:nvPr>
-        </p:nvSpPr>
-        <p:spPr>
-          <a:xfrm>
-            <a:off x="1450848" y="4455367"/>
-            <a:ext cx="6751320" cy="479822"/>
-          </a:xfrm>
-        </p:spPr>
-        <p:txBody>
-          <a:bodyPr>
-            <a:noAutofit/>
-          </a:bodyPr>
-          <a:lstStyle/>
-          <a:p>
-            <a:r>
-              <a:rPr lang="en-US" sz="1200" dirty="0" smtClean="0"/>
-              <a:t>Or we could drop this size data all together and see what happens (we did this in the 2018 assessment).</a:t>
-            </a:r>
-            <a:endParaRPr lang="en-US" sz="1200" dirty="0"/>
           </a:p>
         </p:txBody>
       </p:sp>
     </p:spTree>
     <p:extLst>
       <p:ext uri="{BB962C8B-B14F-4D97-AF65-F5344CB8AC3E}">
-        <p14:creationId xmlns:p14="http://schemas.microsoft.com/office/powerpoint/2010/main" val="1109338796"/>
+        <p14:creationId xmlns:p14="http://schemas.microsoft.com/office/powerpoint/2010/main" val="2563992469"/>
       </p:ext>
     </p:extLst>
   </p:cSld>

</xml_diff>

<commit_message>
April 13 afternoon runs
</commit_message>
<xml_diff>
--- a/Sculley_AssessmentPres.pptx
+++ b/Sculley_AssessmentPres.pptx
@@ -46,6 +46,7 @@
     <p:sldId id="303" r:id="rId40"/>
     <p:sldId id="304" r:id="rId41"/>
     <p:sldId id="305" r:id="rId42"/>
+    <p:sldId id="306" r:id="rId43"/>
   </p:sldIdLst>
   <p:sldSz cx="9144000" cy="5143500" type="screen16x9"/>
   <p:notesSz cx="6858000" cy="9144000"/>
@@ -7744,6 +7745,13 @@
   <p:clrMapOvr>
     <a:masterClrMapping/>
   </p:clrMapOvr>
+  <p:timing>
+    <p:tnLst>
+      <p:par>
+        <p:cTn id="1" dur="indefinite" restart="never" nodeType="tmRoot"/>
+      </p:par>
+    </p:tnLst>
+  </p:timing>
 </p:sld>
 </file>
 
@@ -7774,12 +7782,23 @@
             <p:ph type="title"/>
           </p:nvPr>
         </p:nvSpPr>
-        <p:spPr/>
-        <p:txBody>
-          <a:bodyPr/>
-          <a:lstStyle/>
-          <a:p>
-            <a:endParaRPr lang="en-US"/>
+        <p:spPr>
+          <a:xfrm>
+            <a:off x="457200" y="205979"/>
+            <a:ext cx="8229600" cy="446551"/>
+          </a:xfrm>
+        </p:spPr>
+        <p:txBody>
+          <a:bodyPr>
+            <a:normAutofit fontScale="90000"/>
+          </a:bodyPr>
+          <a:lstStyle/>
+          <a:p>
+            <a:r>
+              <a:rPr lang="en-US" dirty="0" smtClean="0"/>
+              <a:t>April 13 - afternoon</a:t>
+            </a:r>
+            <a:endParaRPr lang="en-US" dirty="0"/>
           </a:p>
         </p:txBody>
       </p:sp>
@@ -7793,10 +7812,15 @@
             <p:ph idx="1"/>
           </p:nvPr>
         </p:nvSpPr>
-        <p:spPr/>
+        <p:spPr>
+          <a:xfrm>
+            <a:off x="457200" y="837127"/>
+            <a:ext cx="8229600" cy="4099774"/>
+          </a:xfrm>
+        </p:spPr>
         <p:txBody>
           <a:bodyPr>
-            <a:normAutofit fontScale="70000" lnSpcReduction="20000"/>
+            <a:normAutofit fontScale="62500" lnSpcReduction="20000"/>
           </a:bodyPr>
           <a:lstStyle/>
           <a:p>
@@ -7819,6 +7843,31 @@
             <a:r>
               <a:rPr lang="en-US" dirty="0" smtClean="0"/>
               <a:t>– starting point</a:t>
+            </a:r>
+          </a:p>
+          <a:p>
+            <a:pPr marL="0" indent="0">
+              <a:buNone/>
+            </a:pPr>
+            <a:r>
+              <a:rPr lang="en-US" dirty="0" smtClean="0"/>
+              <a:t>Note that for all the following models, the index for US </a:t>
+            </a:r>
+            <a:r>
+              <a:rPr lang="en-US" dirty="0" err="1" smtClean="0"/>
+              <a:t>deepset</a:t>
+            </a:r>
+            <a:r>
+              <a:rPr lang="en-US" dirty="0" smtClean="0"/>
+              <a:t> LL S6 is changed from 31 (recruitment </a:t>
+            </a:r>
+            <a:r>
+              <a:rPr lang="en-US" dirty="0" err="1" smtClean="0"/>
+              <a:t>devs</a:t>
+            </a:r>
+            <a:r>
+              <a:rPr lang="en-US" dirty="0" smtClean="0"/>
+              <a:t>) to 33 (age-0 fish).</a:t>
             </a:r>
             <a:endParaRPr lang="en-US" dirty="0"/>
           </a:p>
@@ -7827,21 +7876,11 @@
               <a:rPr lang="en-US" dirty="0" smtClean="0">
                 <a:hlinkClick r:id="rId2" action="ppaction://hlinkfile"/>
               </a:rPr>
-              <a:t>4_drop S4 and S8, split F9, </a:t>
-            </a:r>
-            <a:r>
-              <a:rPr lang="en-US" smtClean="0">
-                <a:hlinkClick r:id="rId2" action="ppaction://hlinkfile"/>
-              </a:rPr>
-              <a:t>change Amin to 0.5 (80cm)</a:t>
-            </a:r>
-            <a:r>
-              <a:rPr lang="en-US" smtClean="0"/>
-              <a:t> </a:t>
+              <a:t>4_drop S4 and S8, split F9, change Amin to 0.5 (80cm)</a:t>
             </a:r>
             <a:r>
               <a:rPr lang="en-US" dirty="0" smtClean="0"/>
-              <a:t>and lognormal selectivity on TWN and IATTC</a:t>
+              <a:t> and lognormal selectivity on TWN and IATTC</a:t>
             </a:r>
           </a:p>
           <a:p>
@@ -7883,45 +7922,30 @@
           </a:p>
           <a:p>
             <a:r>
-              <a:rPr lang="en-US" dirty="0" smtClean="0"/>
-              <a:t>6_increase </a:t>
-            </a:r>
-            <a:r>
-              <a:rPr lang="en-US" dirty="0"/>
-              <a:t>CV </a:t>
-            </a:r>
-            <a:r>
-              <a:rPr lang="en-US" dirty="0" err="1" smtClean="0"/>
-              <a:t>Lmin</a:t>
-            </a:r>
-            <a:endParaRPr lang="en-US" dirty="0" smtClean="0"/>
-          </a:p>
-          <a:p>
-            <a:pPr lvl="1"/>
-            <a:r>
-              <a:rPr lang="en-US" dirty="0" smtClean="0"/>
-              <a:t>Doesn’t converge (no hessian), R0 very large, improves size comp fit</a:t>
-            </a:r>
-            <a:endParaRPr lang="en-US" dirty="0"/>
-          </a:p>
-          <a:p>
-            <a:r>
               <a:rPr lang="en-US" dirty="0" smtClean="0">
                 <a:hlinkClick r:id="rId3" action="ppaction://hlinkfile"/>
               </a:rPr>
-              <a:t>7_lognormal </a:t>
+              <a:t>6_increase </a:t>
+            </a:r>
+            <a:r>
+              <a:rPr lang="en-US" dirty="0">
+                <a:hlinkClick r:id="rId3" action="ppaction://hlinkfile"/>
+              </a:rPr>
+              <a:t>CV </a:t>
             </a:r>
             <a:r>
               <a:rPr lang="en-US" dirty="0" err="1" smtClean="0">
                 <a:hlinkClick r:id="rId3" action="ppaction://hlinkfile"/>
               </a:rPr>
-              <a:t>selec</a:t>
-            </a:r>
-            <a:r>
-              <a:rPr lang="en-US" dirty="0" smtClean="0">
-                <a:hlinkClick r:id="rId3" action="ppaction://hlinkfile"/>
-              </a:rPr>
-              <a:t>, split F9, drop S4 and S8 </a:t>
+              <a:t>Lmin</a:t>
+            </a:r>
+            <a:endParaRPr lang="en-US" dirty="0" smtClean="0"/>
+          </a:p>
+          <a:p>
+            <a:pPr lvl="1"/>
+            <a:r>
+              <a:rPr lang="en-US" dirty="0" smtClean="0"/>
+              <a:t>R0 very large, improves size comp fit</a:t>
             </a:r>
             <a:endParaRPr lang="en-US" dirty="0"/>
           </a:p>
@@ -7930,18 +7954,61 @@
               <a:rPr lang="en-US" dirty="0" smtClean="0">
                 <a:hlinkClick r:id="rId4" action="ppaction://hlinkfile"/>
               </a:rPr>
+              <a:t>7_lognormal selectivity, F9 one fleet, drop S4 and S8 – like model 2</a:t>
+            </a:r>
+          </a:p>
+          <a:p>
+            <a:pPr lvl="1"/>
+            <a:r>
+              <a:rPr lang="en-US" dirty="0" smtClean="0">
+                <a:hlinkClick r:id="rId4" action="ppaction://hlinkfile"/>
+              </a:rPr>
+              <a:t>poor F9 fit </a:t>
+            </a:r>
+            <a:endParaRPr lang="en-US" dirty="0"/>
+          </a:p>
+          <a:p>
+            <a:r>
+              <a:rPr lang="en-US" dirty="0" smtClean="0">
+                <a:hlinkClick r:id="rId5" action="ppaction://hlinkfile"/>
+              </a:rPr>
               <a:t>8_lognormal selectivity, F9 one fleet, change </a:t>
             </a:r>
             <a:r>
               <a:rPr lang="en-US" dirty="0" smtClean="0"/>
               <a:t>Amin to 0.5</a:t>
             </a:r>
+          </a:p>
+          <a:p>
+            <a:pPr lvl="1"/>
+            <a:r>
+              <a:rPr lang="en-US" dirty="0" smtClean="0"/>
+              <a:t>R0 rather large, some </a:t>
+            </a:r>
+            <a:r>
+              <a:rPr lang="en-US" dirty="0" err="1" smtClean="0"/>
+              <a:t>mis</a:t>
+            </a:r>
+            <a:r>
+              <a:rPr lang="en-US" dirty="0" smtClean="0"/>
+              <a:t>-fit in F9 but not bad</a:t>
+            </a:r>
             <a:endParaRPr lang="en-US" dirty="0"/>
           </a:p>
           <a:p>
             <a:r>
+              <a:rPr lang="en-US" dirty="0" smtClean="0">
+                <a:hlinkClick r:id="rId6" action="ppaction://hlinkfile"/>
+              </a:rPr>
+              <a:t>9_drop S4 and S8, split F9, lognormal selectivity</a:t>
+            </a:r>
+            <a:endParaRPr lang="en-US" dirty="0" smtClean="0"/>
+          </a:p>
+          <a:p>
+            <a:pPr lvl="1"/>
+            <a:r>
               <a:rPr lang="en-US" dirty="0" smtClean="0"/>
-              <a:t>9_drop S4 and S8, split F9, lognormal selectivity</a:t>
+              <a:t>Improves fit to size comp data, very large R0</a:t>
             </a:r>
             <a:endParaRPr lang="en-US" dirty="0"/>
           </a:p>
@@ -7957,6 +8024,26 @@
             <a:r>
               <a:rPr lang="en-US" dirty="0" smtClean="0"/>
               <a:t> CV, lognormal selectivity</a:t>
+            </a:r>
+          </a:p>
+          <a:p>
+            <a:pPr lvl="1"/>
+            <a:r>
+              <a:rPr lang="en-US" dirty="0" smtClean="0"/>
+              <a:t>In progress</a:t>
+            </a:r>
+          </a:p>
+          <a:p>
+            <a:r>
+              <a:rPr lang="en-US" dirty="0" smtClean="0"/>
+              <a:t>11_split F9, drop Q3/4 size, change Amin to 0.5, drop S4 and S8, lognormal selectivity</a:t>
+            </a:r>
+          </a:p>
+          <a:p>
+            <a:pPr lvl="1"/>
+            <a:r>
+              <a:rPr lang="en-US" dirty="0" smtClean="0"/>
+              <a:t>In progress</a:t>
             </a:r>
             <a:endParaRPr lang="en-US" dirty="0"/>
           </a:p>
@@ -7972,6 +8059,408 @@
   <p:clrMapOvr>
     <a:masterClrMapping/>
   </p:clrMapOvr>
+  <p:timing>
+    <p:tnLst>
+      <p:par>
+        <p:cTn id="1" dur="indefinite" restart="never" nodeType="tmRoot"/>
+      </p:par>
+    </p:tnLst>
+  </p:timing>
+</p:sld>
+</file>
+
+<file path=ppt/slides/slide42.xml><?xml version="1.0" encoding="utf-8"?>
+<p:sld xmlns:a="http://schemas.openxmlformats.org/drawingml/2006/main" xmlns:r="http://schemas.openxmlformats.org/officeDocument/2006/relationships" xmlns:p="http://schemas.openxmlformats.org/presentationml/2006/main">
+  <p:cSld>
+    <p:spTree>
+      <p:nvGrpSpPr>
+        <p:cNvPr id="1" name=""/>
+        <p:cNvGrpSpPr/>
+        <p:nvPr/>
+      </p:nvGrpSpPr>
+      <p:grpSpPr>
+        <a:xfrm>
+          <a:off x="0" y="0"/>
+          <a:ext cx="0" cy="0"/>
+          <a:chOff x="0" y="0"/>
+          <a:chExt cx="0" cy="0"/>
+        </a:xfrm>
+      </p:grpSpPr>
+      <p:sp>
+        <p:nvSpPr>
+          <p:cNvPr id="4" name="Title 3"/>
+          <p:cNvSpPr>
+            <a:spLocks noGrp="1"/>
+          </p:cNvSpPr>
+          <p:nvPr>
+            <p:ph type="title"/>
+          </p:nvPr>
+        </p:nvSpPr>
+        <p:spPr/>
+        <p:txBody>
+          <a:bodyPr/>
+          <a:lstStyle/>
+          <a:p>
+            <a:r>
+              <a:rPr lang="en-US" dirty="0" smtClean="0"/>
+              <a:t>Next runs</a:t>
+            </a:r>
+            <a:endParaRPr lang="en-US" dirty="0"/>
+          </a:p>
+        </p:txBody>
+      </p:sp>
+      <p:sp>
+        <p:nvSpPr>
+          <p:cNvPr id="5" name="Content Placeholder 4"/>
+          <p:cNvSpPr>
+            <a:spLocks noGrp="1"/>
+          </p:cNvSpPr>
+          <p:nvPr>
+            <p:ph sz="half" idx="1"/>
+          </p:nvPr>
+        </p:nvSpPr>
+        <p:spPr>
+          <a:xfrm>
+            <a:off x="457200" y="1200151"/>
+            <a:ext cx="2603500" cy="3394472"/>
+          </a:xfrm>
+        </p:spPr>
+        <p:txBody>
+          <a:bodyPr>
+            <a:normAutofit/>
+          </a:bodyPr>
+          <a:lstStyle/>
+          <a:p>
+            <a:r>
+              <a:rPr lang="en-US" dirty="0" smtClean="0"/>
+              <a:t>Mirror F9 catch to US shallow early</a:t>
+            </a:r>
+          </a:p>
+          <a:p>
+            <a:r>
+              <a:rPr lang="en-US" dirty="0" smtClean="0"/>
+              <a:t>Decrease Amin to 0.5</a:t>
+            </a:r>
+          </a:p>
+          <a:p>
+            <a:r>
+              <a:rPr lang="en-US" dirty="0" smtClean="0"/>
+              <a:t>Change IATTC and TWN selectivity</a:t>
+            </a:r>
+          </a:p>
+          <a:p>
+            <a:r>
+              <a:rPr lang="en-US" dirty="0" smtClean="0"/>
+              <a:t>Drop S4 and S8</a:t>
+            </a:r>
+            <a:endParaRPr lang="en-US" dirty="0"/>
+          </a:p>
+        </p:txBody>
+      </p:sp>
+      <p:sp>
+        <p:nvSpPr>
+          <p:cNvPr id="6" name="Content Placeholder 5"/>
+          <p:cNvSpPr>
+            <a:spLocks noGrp="1"/>
+          </p:cNvSpPr>
+          <p:nvPr>
+            <p:ph sz="half" idx="2"/>
+          </p:nvPr>
+        </p:nvSpPr>
+        <p:spPr>
+          <a:xfrm>
+            <a:off x="6354231" y="1063229"/>
+            <a:ext cx="2628901" cy="3394472"/>
+          </a:xfrm>
+        </p:spPr>
+        <p:txBody>
+          <a:bodyPr>
+            <a:normAutofit/>
+          </a:bodyPr>
+          <a:lstStyle/>
+          <a:p>
+            <a:r>
+              <a:rPr lang="en-US" dirty="0"/>
+              <a:t>Mirror F9 catch to US shallow early</a:t>
+            </a:r>
+          </a:p>
+          <a:p>
+            <a:r>
+              <a:rPr lang="en-US" dirty="0" smtClean="0"/>
+              <a:t>Keep Amin @1yr</a:t>
+            </a:r>
+          </a:p>
+          <a:p>
+            <a:r>
+              <a:rPr lang="en-US" dirty="0" smtClean="0"/>
+              <a:t>Change IATTC and TWN selectivity </a:t>
+            </a:r>
+          </a:p>
+          <a:p>
+            <a:r>
+              <a:rPr lang="en-US" dirty="0" smtClean="0"/>
+              <a:t>Drop S4 and S8</a:t>
+            </a:r>
+            <a:endParaRPr lang="en-US" dirty="0"/>
+          </a:p>
+          <a:p>
+            <a:r>
+              <a:rPr lang="en-US" dirty="0" smtClean="0"/>
+              <a:t>(Increase weight of CPUE indices)</a:t>
+            </a:r>
+          </a:p>
+          <a:p>
+            <a:pPr marL="0" indent="0">
+              <a:buNone/>
+            </a:pPr>
+            <a:endParaRPr lang="en-US" dirty="0"/>
+          </a:p>
+        </p:txBody>
+      </p:sp>
+      <p:sp>
+        <p:nvSpPr>
+          <p:cNvPr id="7" name="Content Placeholder 5"/>
+          <p:cNvSpPr txBox="1">
+            <a:spLocks/>
+          </p:cNvSpPr>
+          <p:nvPr/>
+        </p:nvSpPr>
+        <p:spPr>
+          <a:xfrm>
+            <a:off x="3119967" y="1063229"/>
+            <a:ext cx="3124200" cy="3394472"/>
+          </a:xfrm>
+          <a:prstGeom prst="rect">
+            <a:avLst/>
+          </a:prstGeom>
+        </p:spPr>
+        <p:txBody>
+          <a:bodyPr vert="horz" lIns="91440" tIns="45720" rIns="91440" bIns="45720" rtlCol="0">
+            <a:normAutofit/>
+          </a:bodyPr>
+          <a:lstStyle>
+            <a:lvl1pPr marL="342900" indent="-342900" algn="l" defTabSz="342900" rtl="0" eaLnBrk="1" latinLnBrk="0" hangingPunct="1">
+              <a:spcBef>
+                <a:spcPct val="20000"/>
+              </a:spcBef>
+              <a:buFont typeface="Arial"/>
+              <a:buChar char="•"/>
+              <a:defRPr sz="2100" kern="1200">
+                <a:solidFill>
+                  <a:schemeClr val="tx1"/>
+                </a:solidFill>
+                <a:latin typeface="+mn-lt"/>
+                <a:ea typeface="+mn-ea"/>
+                <a:cs typeface="+mn-cs"/>
+              </a:defRPr>
+            </a:lvl1pPr>
+            <a:lvl2pPr marL="685800" indent="-342900" algn="l" defTabSz="342900" rtl="0" eaLnBrk="1" latinLnBrk="0" hangingPunct="1">
+              <a:spcBef>
+                <a:spcPct val="20000"/>
+              </a:spcBef>
+              <a:buFont typeface="Arial"/>
+              <a:buChar char="–"/>
+              <a:defRPr sz="1800" kern="1200">
+                <a:solidFill>
+                  <a:schemeClr val="tx1"/>
+                </a:solidFill>
+                <a:latin typeface="+mn-lt"/>
+                <a:ea typeface="+mn-ea"/>
+                <a:cs typeface="+mn-cs"/>
+              </a:defRPr>
+            </a:lvl2pPr>
+            <a:lvl3pPr marL="1028700" indent="-342900" algn="l" defTabSz="342900" rtl="0" eaLnBrk="1" latinLnBrk="0" hangingPunct="1">
+              <a:spcBef>
+                <a:spcPct val="20000"/>
+              </a:spcBef>
+              <a:buFont typeface="Arial"/>
+              <a:buChar char="•"/>
+              <a:defRPr sz="1500" kern="1200">
+                <a:solidFill>
+                  <a:schemeClr val="tx1"/>
+                </a:solidFill>
+                <a:latin typeface="+mn-lt"/>
+                <a:ea typeface="+mn-ea"/>
+                <a:cs typeface="+mn-cs"/>
+              </a:defRPr>
+            </a:lvl3pPr>
+            <a:lvl4pPr marL="1371600" indent="-342900" algn="l" defTabSz="342900" rtl="0" eaLnBrk="1" latinLnBrk="0" hangingPunct="1">
+              <a:spcBef>
+                <a:spcPct val="20000"/>
+              </a:spcBef>
+              <a:buFont typeface="Arial"/>
+              <a:buChar char="–"/>
+              <a:defRPr sz="1350" kern="1200">
+                <a:solidFill>
+                  <a:schemeClr val="tx1"/>
+                </a:solidFill>
+                <a:latin typeface="+mn-lt"/>
+                <a:ea typeface="+mn-ea"/>
+                <a:cs typeface="+mn-cs"/>
+              </a:defRPr>
+            </a:lvl4pPr>
+            <a:lvl5pPr marL="1714500" indent="-342900" algn="l" defTabSz="342900" rtl="0" eaLnBrk="1" latinLnBrk="0" hangingPunct="1">
+              <a:spcBef>
+                <a:spcPct val="20000"/>
+              </a:spcBef>
+              <a:buFont typeface="Arial"/>
+              <a:buChar char="»"/>
+              <a:defRPr sz="1350" kern="1200">
+                <a:solidFill>
+                  <a:schemeClr val="tx1"/>
+                </a:solidFill>
+                <a:latin typeface="+mn-lt"/>
+                <a:ea typeface="+mn-ea"/>
+                <a:cs typeface="+mn-cs"/>
+              </a:defRPr>
+            </a:lvl5pPr>
+            <a:lvl6pPr marL="2057400" indent="-342900" algn="l" defTabSz="342900" rtl="0" eaLnBrk="1" latinLnBrk="0" hangingPunct="1">
+              <a:spcBef>
+                <a:spcPct val="20000"/>
+              </a:spcBef>
+              <a:buFont typeface="Arial"/>
+              <a:buChar char="•"/>
+              <a:defRPr sz="1350" kern="1200">
+                <a:solidFill>
+                  <a:schemeClr val="tx1"/>
+                </a:solidFill>
+                <a:latin typeface="+mn-lt"/>
+                <a:ea typeface="+mn-ea"/>
+                <a:cs typeface="+mn-cs"/>
+              </a:defRPr>
+            </a:lvl6pPr>
+            <a:lvl7pPr marL="2400300" indent="-342900" algn="l" defTabSz="342900" rtl="0" eaLnBrk="1" latinLnBrk="0" hangingPunct="1">
+              <a:spcBef>
+                <a:spcPct val="20000"/>
+              </a:spcBef>
+              <a:buFont typeface="Arial"/>
+              <a:buChar char="•"/>
+              <a:defRPr sz="1350" kern="1200">
+                <a:solidFill>
+                  <a:schemeClr val="tx1"/>
+                </a:solidFill>
+                <a:latin typeface="+mn-lt"/>
+                <a:ea typeface="+mn-ea"/>
+                <a:cs typeface="+mn-cs"/>
+              </a:defRPr>
+            </a:lvl7pPr>
+            <a:lvl8pPr marL="2743200" indent="-342900" algn="l" defTabSz="342900" rtl="0" eaLnBrk="1" latinLnBrk="0" hangingPunct="1">
+              <a:spcBef>
+                <a:spcPct val="20000"/>
+              </a:spcBef>
+              <a:buFont typeface="Arial"/>
+              <a:buChar char="•"/>
+              <a:defRPr sz="1350" kern="1200">
+                <a:solidFill>
+                  <a:schemeClr val="tx1"/>
+                </a:solidFill>
+                <a:latin typeface="+mn-lt"/>
+                <a:ea typeface="+mn-ea"/>
+                <a:cs typeface="+mn-cs"/>
+              </a:defRPr>
+            </a:lvl8pPr>
+            <a:lvl9pPr marL="3086100" indent="-342900" algn="l" defTabSz="342900" rtl="0" eaLnBrk="1" latinLnBrk="0" hangingPunct="1">
+              <a:spcBef>
+                <a:spcPct val="20000"/>
+              </a:spcBef>
+              <a:buFont typeface="Arial"/>
+              <a:buChar char="•"/>
+              <a:defRPr sz="1350" kern="1200">
+                <a:solidFill>
+                  <a:schemeClr val="tx1"/>
+                </a:solidFill>
+                <a:latin typeface="+mn-lt"/>
+                <a:ea typeface="+mn-ea"/>
+                <a:cs typeface="+mn-cs"/>
+              </a:defRPr>
+            </a:lvl9pPr>
+          </a:lstStyle>
+          <a:p>
+            <a:r>
+              <a:rPr lang="en-US" dirty="0" smtClean="0"/>
+              <a:t>Mirror F9 catch to US shallow early</a:t>
+            </a:r>
+          </a:p>
+          <a:p>
+            <a:r>
+              <a:rPr lang="en-US" dirty="0" smtClean="0"/>
+              <a:t>Keep Amin @1yr</a:t>
+            </a:r>
+          </a:p>
+          <a:p>
+            <a:r>
+              <a:rPr lang="en-US" dirty="0" smtClean="0"/>
+              <a:t>Change IATTC and TWN selectivity </a:t>
+            </a:r>
+          </a:p>
+          <a:p>
+            <a:r>
+              <a:rPr lang="en-US" dirty="0" smtClean="0"/>
+              <a:t>Drop S4 and S8</a:t>
+            </a:r>
+          </a:p>
+          <a:p>
+            <a:r>
+              <a:rPr lang="en-US" dirty="0" smtClean="0"/>
+              <a:t>Fix initial equilibrium catch at 2018 b-c levels</a:t>
+            </a:r>
+          </a:p>
+          <a:p>
+            <a:pPr marL="0" indent="0">
+              <a:buFont typeface="Arial"/>
+              <a:buNone/>
+            </a:pPr>
+            <a:endParaRPr lang="en-US" dirty="0"/>
+          </a:p>
+        </p:txBody>
+      </p:sp>
+      <p:sp>
+        <p:nvSpPr>
+          <p:cNvPr id="8" name="TextBox 7"/>
+          <p:cNvSpPr txBox="1"/>
+          <p:nvPr/>
+        </p:nvSpPr>
+        <p:spPr>
+          <a:xfrm>
+            <a:off x="941696" y="4457701"/>
+            <a:ext cx="4749420" cy="369332"/>
+          </a:xfrm>
+          <a:prstGeom prst="rect">
+            <a:avLst/>
+          </a:prstGeom>
+          <a:noFill/>
+        </p:spPr>
+        <p:txBody>
+          <a:bodyPr wrap="square" rtlCol="0">
+            <a:spAutoFit/>
+          </a:bodyPr>
+          <a:lstStyle/>
+          <a:p>
+            <a:r>
+              <a:rPr lang="en-US" dirty="0" smtClean="0"/>
+              <a:t>Remember to run ASPM for each as well</a:t>
+            </a:r>
+            <a:endParaRPr lang="en-US" dirty="0"/>
+          </a:p>
+        </p:txBody>
+      </p:sp>
+    </p:spTree>
+    <p:extLst>
+      <p:ext uri="{BB962C8B-B14F-4D97-AF65-F5344CB8AC3E}">
+        <p14:creationId xmlns:p14="http://schemas.microsoft.com/office/powerpoint/2010/main" val="3433441230"/>
+      </p:ext>
+    </p:extLst>
+  </p:cSld>
+  <p:clrMapOvr>
+    <a:masterClrMapping/>
+  </p:clrMapOvr>
+  <p:timing>
+    <p:tnLst>
+      <p:par>
+        <p:cTn id="1" dur="indefinite" restart="never" nodeType="tmRoot"/>
+      </p:par>
+    </p:tnLst>
+  </p:timing>
 </p:sld>
 </file>
 

</xml_diff>

<commit_message>
April 14 model runs
</commit_message>
<xml_diff>
--- a/Sculley_AssessmentPres.pptx
+++ b/Sculley_AssessmentPres.pptx
@@ -8131,6 +8131,15 @@
           </a:bodyPr>
           <a:lstStyle/>
           <a:p>
+            <a:pPr marL="0" indent="0">
+              <a:buNone/>
+            </a:pPr>
+            <a:r>
+              <a:rPr lang="en-US" dirty="0" smtClean="0"/>
+              <a:t>Model 12</a:t>
+            </a:r>
+          </a:p>
+          <a:p>
             <a:r>
               <a:rPr lang="en-US" dirty="0" smtClean="0"/>
               <a:t>Mirror F9 catch to US shallow early</a:t>
@@ -8145,7 +8154,7 @@
           <a:p>
             <a:r>
               <a:rPr lang="en-US" dirty="0" smtClean="0"/>
-              <a:t>Change IATTC and TWN selectivity</a:t>
+              <a:t>Change IATTC selectivity</a:t>
             </a:r>
           </a:p>
           <a:p>
@@ -8179,9 +8188,22 @@
           </a:bodyPr>
           <a:lstStyle/>
           <a:p>
+            <a:pPr marL="0" indent="0">
+              <a:buNone/>
+            </a:pPr>
+            <a:r>
+              <a:rPr lang="en-US" dirty="0" smtClean="0"/>
+              <a:t>Model 14</a:t>
+            </a:r>
+          </a:p>
+          <a:p>
+            <a:r>
+              <a:rPr lang="en-US" dirty="0" smtClean="0"/>
+              <a:t>Mirror </a:t>
+            </a:r>
             <a:r>
               <a:rPr lang="en-US" dirty="0"/>
-              <a:t>Mirror F9 catch to US shallow early</a:t>
+              <a:t>F9 catch to US shallow early</a:t>
             </a:r>
           </a:p>
           <a:p>
@@ -8376,6 +8398,15 @@
             </a:lvl9pPr>
           </a:lstStyle>
           <a:p>
+            <a:pPr marL="0" indent="0">
+              <a:buNone/>
+            </a:pPr>
+            <a:r>
+              <a:rPr lang="en-US" dirty="0" smtClean="0"/>
+              <a:t>Model 13</a:t>
+            </a:r>
+          </a:p>
+          <a:p>
             <a:r>
               <a:rPr lang="en-US" dirty="0" smtClean="0"/>
               <a:t>Mirror F9 catch to US shallow early</a:t>
@@ -8390,7 +8421,7 @@
           <a:p>
             <a:r>
               <a:rPr lang="en-US" dirty="0" smtClean="0"/>
-              <a:t>Change IATTC and TWN selectivity </a:t>
+              <a:t>Change IATTC selectivity </a:t>
             </a:r>
           </a:p>
           <a:p>

</xml_diff>

<commit_message>
End of day April 14
</commit_message>
<xml_diff>
--- a/Sculley_AssessmentPres.pptx
+++ b/Sculley_AssessmentPres.pptx
@@ -4,6 +4,9 @@
   <p:sldMasterIdLst>
     <p:sldMasterId id="2147483648" r:id="rId1"/>
   </p:sldMasterIdLst>
+  <p:notesMasterIdLst>
+    <p:notesMasterId r:id="rId53"/>
+  </p:notesMasterIdLst>
   <p:sldIdLst>
     <p:sldId id="256" r:id="rId2"/>
     <p:sldId id="260" r:id="rId3"/>
@@ -47,6 +50,15 @@
     <p:sldId id="304" r:id="rId41"/>
     <p:sldId id="305" r:id="rId42"/>
     <p:sldId id="306" r:id="rId43"/>
+    <p:sldId id="307" r:id="rId44"/>
+    <p:sldId id="308" r:id="rId45"/>
+    <p:sldId id="309" r:id="rId46"/>
+    <p:sldId id="310" r:id="rId47"/>
+    <p:sldId id="311" r:id="rId48"/>
+    <p:sldId id="312" r:id="rId49"/>
+    <p:sldId id="313" r:id="rId50"/>
+    <p:sldId id="314" r:id="rId51"/>
+    <p:sldId id="315" r:id="rId52"/>
   </p:sldIdLst>
   <p:sldSz cx="9144000" cy="5143500" type="screen16x9"/>
   <p:notesSz cx="6858000" cy="9144000"/>
@@ -162,6 +174,440 @@
     </p:ext>
   </p:extLst>
 </p:presentation>
+</file>
+
+<file path=ppt/notesMasters/notesMaster1.xml><?xml version="1.0" encoding="utf-8"?>
+<p:notesMaster xmlns:a="http://schemas.openxmlformats.org/drawingml/2006/main" xmlns:r="http://schemas.openxmlformats.org/officeDocument/2006/relationships" xmlns:p="http://schemas.openxmlformats.org/presentationml/2006/main">
+  <p:cSld>
+    <p:bg>
+      <p:bgRef idx="1001">
+        <a:schemeClr val="bg1"/>
+      </p:bgRef>
+    </p:bg>
+    <p:spTree>
+      <p:nvGrpSpPr>
+        <p:cNvPr id="1" name=""/>
+        <p:cNvGrpSpPr/>
+        <p:nvPr/>
+      </p:nvGrpSpPr>
+      <p:grpSpPr>
+        <a:xfrm>
+          <a:off x="0" y="0"/>
+          <a:ext cx="0" cy="0"/>
+          <a:chOff x="0" y="0"/>
+          <a:chExt cx="0" cy="0"/>
+        </a:xfrm>
+      </p:grpSpPr>
+      <p:sp>
+        <p:nvSpPr>
+          <p:cNvPr id="2" name="Header Placeholder 1"/>
+          <p:cNvSpPr>
+            <a:spLocks noGrp="1"/>
+          </p:cNvSpPr>
+          <p:nvPr>
+            <p:ph type="hdr" sz="quarter"/>
+          </p:nvPr>
+        </p:nvSpPr>
+        <p:spPr>
+          <a:xfrm>
+            <a:off x="0" y="0"/>
+            <a:ext cx="2971800" cy="458788"/>
+          </a:xfrm>
+          <a:prstGeom prst="rect">
+            <a:avLst/>
+          </a:prstGeom>
+        </p:spPr>
+        <p:txBody>
+          <a:bodyPr vert="horz" lIns="91440" tIns="45720" rIns="91440" bIns="45720" rtlCol="0"/>
+          <a:lstStyle>
+            <a:lvl1pPr algn="l">
+              <a:defRPr sz="1200"/>
+            </a:lvl1pPr>
+          </a:lstStyle>
+          <a:p>
+            <a:endParaRPr lang="en-US"/>
+          </a:p>
+        </p:txBody>
+      </p:sp>
+      <p:sp>
+        <p:nvSpPr>
+          <p:cNvPr id="3" name="Date Placeholder 2"/>
+          <p:cNvSpPr>
+            <a:spLocks noGrp="1"/>
+          </p:cNvSpPr>
+          <p:nvPr>
+            <p:ph type="dt" idx="1"/>
+          </p:nvPr>
+        </p:nvSpPr>
+        <p:spPr>
+          <a:xfrm>
+            <a:off x="3884613" y="0"/>
+            <a:ext cx="2971800" cy="458788"/>
+          </a:xfrm>
+          <a:prstGeom prst="rect">
+            <a:avLst/>
+          </a:prstGeom>
+        </p:spPr>
+        <p:txBody>
+          <a:bodyPr vert="horz" lIns="91440" tIns="45720" rIns="91440" bIns="45720" rtlCol="0"/>
+          <a:lstStyle>
+            <a:lvl1pPr algn="r">
+              <a:defRPr sz="1200"/>
+            </a:lvl1pPr>
+          </a:lstStyle>
+          <a:p>
+            <a:fld id="{9C0358DB-0752-40B5-AE17-F587B68B6448}" type="datetimeFigureOut">
+              <a:rPr lang="en-US" smtClean="0"/>
+              <a:t>4/15/2023</a:t>
+            </a:fld>
+            <a:endParaRPr lang="en-US"/>
+          </a:p>
+        </p:txBody>
+      </p:sp>
+      <p:sp>
+        <p:nvSpPr>
+          <p:cNvPr id="4" name="Slide Image Placeholder 3"/>
+          <p:cNvSpPr>
+            <a:spLocks noGrp="1" noRot="1" noChangeAspect="1"/>
+          </p:cNvSpPr>
+          <p:nvPr>
+            <p:ph type="sldImg" idx="2"/>
+          </p:nvPr>
+        </p:nvSpPr>
+        <p:spPr>
+          <a:xfrm>
+            <a:off x="685800" y="1143000"/>
+            <a:ext cx="5486400" cy="3086100"/>
+          </a:xfrm>
+          <a:prstGeom prst="rect">
+            <a:avLst/>
+          </a:prstGeom>
+          <a:noFill/>
+          <a:ln w="12700">
+            <a:solidFill>
+              <a:prstClr val="black"/>
+            </a:solidFill>
+          </a:ln>
+        </p:spPr>
+        <p:txBody>
+          <a:bodyPr vert="horz" lIns="91440" tIns="45720" rIns="91440" bIns="45720" rtlCol="0" anchor="ctr"/>
+          <a:lstStyle/>
+          <a:p>
+            <a:endParaRPr lang="en-US"/>
+          </a:p>
+        </p:txBody>
+      </p:sp>
+      <p:sp>
+        <p:nvSpPr>
+          <p:cNvPr id="5" name="Notes Placeholder 4"/>
+          <p:cNvSpPr>
+            <a:spLocks noGrp="1"/>
+          </p:cNvSpPr>
+          <p:nvPr>
+            <p:ph type="body" sz="quarter" idx="3"/>
+          </p:nvPr>
+        </p:nvSpPr>
+        <p:spPr>
+          <a:xfrm>
+            <a:off x="685800" y="4400550"/>
+            <a:ext cx="5486400" cy="3600450"/>
+          </a:xfrm>
+          <a:prstGeom prst="rect">
+            <a:avLst/>
+          </a:prstGeom>
+        </p:spPr>
+        <p:txBody>
+          <a:bodyPr vert="horz" lIns="91440" tIns="45720" rIns="91440" bIns="45720" rtlCol="0"/>
+          <a:lstStyle/>
+          <a:p>
+            <a:pPr lvl="0"/>
+            <a:r>
+              <a:rPr lang="en-US" smtClean="0"/>
+              <a:t>Edit Master text styles</a:t>
+            </a:r>
+          </a:p>
+          <a:p>
+            <a:pPr lvl="1"/>
+            <a:r>
+              <a:rPr lang="en-US" smtClean="0"/>
+              <a:t>Second level</a:t>
+            </a:r>
+          </a:p>
+          <a:p>
+            <a:pPr lvl="2"/>
+            <a:r>
+              <a:rPr lang="en-US" smtClean="0"/>
+              <a:t>Third level</a:t>
+            </a:r>
+          </a:p>
+          <a:p>
+            <a:pPr lvl="3"/>
+            <a:r>
+              <a:rPr lang="en-US" smtClean="0"/>
+              <a:t>Fourth level</a:t>
+            </a:r>
+          </a:p>
+          <a:p>
+            <a:pPr lvl="4"/>
+            <a:r>
+              <a:rPr lang="en-US" smtClean="0"/>
+              <a:t>Fifth level</a:t>
+            </a:r>
+            <a:endParaRPr lang="en-US"/>
+          </a:p>
+        </p:txBody>
+      </p:sp>
+      <p:sp>
+        <p:nvSpPr>
+          <p:cNvPr id="6" name="Footer Placeholder 5"/>
+          <p:cNvSpPr>
+            <a:spLocks noGrp="1"/>
+          </p:cNvSpPr>
+          <p:nvPr>
+            <p:ph type="ftr" sz="quarter" idx="4"/>
+          </p:nvPr>
+        </p:nvSpPr>
+        <p:spPr>
+          <a:xfrm>
+            <a:off x="0" y="8685213"/>
+            <a:ext cx="2971800" cy="458787"/>
+          </a:xfrm>
+          <a:prstGeom prst="rect">
+            <a:avLst/>
+          </a:prstGeom>
+        </p:spPr>
+        <p:txBody>
+          <a:bodyPr vert="horz" lIns="91440" tIns="45720" rIns="91440" bIns="45720" rtlCol="0" anchor="b"/>
+          <a:lstStyle>
+            <a:lvl1pPr algn="l">
+              <a:defRPr sz="1200"/>
+            </a:lvl1pPr>
+          </a:lstStyle>
+          <a:p>
+            <a:endParaRPr lang="en-US"/>
+          </a:p>
+        </p:txBody>
+      </p:sp>
+      <p:sp>
+        <p:nvSpPr>
+          <p:cNvPr id="7" name="Slide Number Placeholder 6"/>
+          <p:cNvSpPr>
+            <a:spLocks noGrp="1"/>
+          </p:cNvSpPr>
+          <p:nvPr>
+            <p:ph type="sldNum" sz="quarter" idx="5"/>
+          </p:nvPr>
+        </p:nvSpPr>
+        <p:spPr>
+          <a:xfrm>
+            <a:off x="3884613" y="8685213"/>
+            <a:ext cx="2971800" cy="458787"/>
+          </a:xfrm>
+          <a:prstGeom prst="rect">
+            <a:avLst/>
+          </a:prstGeom>
+        </p:spPr>
+        <p:txBody>
+          <a:bodyPr vert="horz" lIns="91440" tIns="45720" rIns="91440" bIns="45720" rtlCol="0" anchor="b"/>
+          <a:lstStyle>
+            <a:lvl1pPr algn="r">
+              <a:defRPr sz="1200"/>
+            </a:lvl1pPr>
+          </a:lstStyle>
+          <a:p>
+            <a:fld id="{7A15A026-3F06-481B-8588-1FF2E6F0F8AE}" type="slidenum">
+              <a:rPr lang="en-US" smtClean="0"/>
+              <a:t>‹#›</a:t>
+            </a:fld>
+            <a:endParaRPr lang="en-US"/>
+          </a:p>
+        </p:txBody>
+      </p:sp>
+    </p:spTree>
+    <p:extLst>
+      <p:ext uri="{BB962C8B-B14F-4D97-AF65-F5344CB8AC3E}">
+        <p14:creationId xmlns:p14="http://schemas.microsoft.com/office/powerpoint/2010/main" val="664595714"/>
+      </p:ext>
+    </p:extLst>
+  </p:cSld>
+  <p:clrMap bg1="lt1" tx1="dk1" bg2="lt2" tx2="dk2" accent1="accent1" accent2="accent2" accent3="accent3" accent4="accent4" accent5="accent5" accent6="accent6" hlink="hlink" folHlink="folHlink"/>
+  <p:notesStyle>
+    <a:lvl1pPr marL="0" algn="l" defTabSz="914400" rtl="0" eaLnBrk="1" latinLnBrk="0" hangingPunct="1">
+      <a:defRPr sz="1200" kern="1200">
+        <a:solidFill>
+          <a:schemeClr val="tx1"/>
+        </a:solidFill>
+        <a:latin typeface="+mn-lt"/>
+        <a:ea typeface="+mn-ea"/>
+        <a:cs typeface="+mn-cs"/>
+      </a:defRPr>
+    </a:lvl1pPr>
+    <a:lvl2pPr marL="457200" algn="l" defTabSz="914400" rtl="0" eaLnBrk="1" latinLnBrk="0" hangingPunct="1">
+      <a:defRPr sz="1200" kern="1200">
+        <a:solidFill>
+          <a:schemeClr val="tx1"/>
+        </a:solidFill>
+        <a:latin typeface="+mn-lt"/>
+        <a:ea typeface="+mn-ea"/>
+        <a:cs typeface="+mn-cs"/>
+      </a:defRPr>
+    </a:lvl2pPr>
+    <a:lvl3pPr marL="914400" algn="l" defTabSz="914400" rtl="0" eaLnBrk="1" latinLnBrk="0" hangingPunct="1">
+      <a:defRPr sz="1200" kern="1200">
+        <a:solidFill>
+          <a:schemeClr val="tx1"/>
+        </a:solidFill>
+        <a:latin typeface="+mn-lt"/>
+        <a:ea typeface="+mn-ea"/>
+        <a:cs typeface="+mn-cs"/>
+      </a:defRPr>
+    </a:lvl3pPr>
+    <a:lvl4pPr marL="1371600" algn="l" defTabSz="914400" rtl="0" eaLnBrk="1" latinLnBrk="0" hangingPunct="1">
+      <a:defRPr sz="1200" kern="1200">
+        <a:solidFill>
+          <a:schemeClr val="tx1"/>
+        </a:solidFill>
+        <a:latin typeface="+mn-lt"/>
+        <a:ea typeface="+mn-ea"/>
+        <a:cs typeface="+mn-cs"/>
+      </a:defRPr>
+    </a:lvl4pPr>
+    <a:lvl5pPr marL="1828800" algn="l" defTabSz="914400" rtl="0" eaLnBrk="1" latinLnBrk="0" hangingPunct="1">
+      <a:defRPr sz="1200" kern="1200">
+        <a:solidFill>
+          <a:schemeClr val="tx1"/>
+        </a:solidFill>
+        <a:latin typeface="+mn-lt"/>
+        <a:ea typeface="+mn-ea"/>
+        <a:cs typeface="+mn-cs"/>
+      </a:defRPr>
+    </a:lvl5pPr>
+    <a:lvl6pPr marL="2286000" algn="l" defTabSz="914400" rtl="0" eaLnBrk="1" latinLnBrk="0" hangingPunct="1">
+      <a:defRPr sz="1200" kern="1200">
+        <a:solidFill>
+          <a:schemeClr val="tx1"/>
+        </a:solidFill>
+        <a:latin typeface="+mn-lt"/>
+        <a:ea typeface="+mn-ea"/>
+        <a:cs typeface="+mn-cs"/>
+      </a:defRPr>
+    </a:lvl6pPr>
+    <a:lvl7pPr marL="2743200" algn="l" defTabSz="914400" rtl="0" eaLnBrk="1" latinLnBrk="0" hangingPunct="1">
+      <a:defRPr sz="1200" kern="1200">
+        <a:solidFill>
+          <a:schemeClr val="tx1"/>
+        </a:solidFill>
+        <a:latin typeface="+mn-lt"/>
+        <a:ea typeface="+mn-ea"/>
+        <a:cs typeface="+mn-cs"/>
+      </a:defRPr>
+    </a:lvl7pPr>
+    <a:lvl8pPr marL="3200400" algn="l" defTabSz="914400" rtl="0" eaLnBrk="1" latinLnBrk="0" hangingPunct="1">
+      <a:defRPr sz="1200" kern="1200">
+        <a:solidFill>
+          <a:schemeClr val="tx1"/>
+        </a:solidFill>
+        <a:latin typeface="+mn-lt"/>
+        <a:ea typeface="+mn-ea"/>
+        <a:cs typeface="+mn-cs"/>
+      </a:defRPr>
+    </a:lvl8pPr>
+    <a:lvl9pPr marL="3657600" algn="l" defTabSz="914400" rtl="0" eaLnBrk="1" latinLnBrk="0" hangingPunct="1">
+      <a:defRPr sz="1200" kern="1200">
+        <a:solidFill>
+          <a:schemeClr val="tx1"/>
+        </a:solidFill>
+        <a:latin typeface="+mn-lt"/>
+        <a:ea typeface="+mn-ea"/>
+        <a:cs typeface="+mn-cs"/>
+      </a:defRPr>
+    </a:lvl9pPr>
+  </p:notesStyle>
+</p:notesMaster>
+</file>
+
+<file path=ppt/notesSlides/notesSlide1.xml><?xml version="1.0" encoding="utf-8"?>
+<p:notes xmlns:a="http://schemas.openxmlformats.org/drawingml/2006/main" xmlns:r="http://schemas.openxmlformats.org/officeDocument/2006/relationships" xmlns:p="http://schemas.openxmlformats.org/presentationml/2006/main">
+  <p:cSld>
+    <p:spTree>
+      <p:nvGrpSpPr>
+        <p:cNvPr id="1" name=""/>
+        <p:cNvGrpSpPr/>
+        <p:nvPr/>
+      </p:nvGrpSpPr>
+      <p:grpSpPr>
+        <a:xfrm>
+          <a:off x="0" y="0"/>
+          <a:ext cx="0" cy="0"/>
+          <a:chOff x="0" y="0"/>
+          <a:chExt cx="0" cy="0"/>
+        </a:xfrm>
+      </p:grpSpPr>
+      <p:sp>
+        <p:nvSpPr>
+          <p:cNvPr id="2" name="Slide Image Placeholder 1"/>
+          <p:cNvSpPr>
+            <a:spLocks noGrp="1" noRot="1" noChangeAspect="1"/>
+          </p:cNvSpPr>
+          <p:nvPr>
+            <p:ph type="sldImg"/>
+          </p:nvPr>
+        </p:nvSpPr>
+        <p:spPr/>
+      </p:sp>
+      <p:sp>
+        <p:nvSpPr>
+          <p:cNvPr id="3" name="Notes Placeholder 2"/>
+          <p:cNvSpPr>
+            <a:spLocks noGrp="1"/>
+          </p:cNvSpPr>
+          <p:nvPr>
+            <p:ph type="body" idx="1"/>
+          </p:nvPr>
+        </p:nvSpPr>
+        <p:spPr/>
+        <p:txBody>
+          <a:bodyPr/>
+          <a:lstStyle/>
+          <a:p>
+            <a:endParaRPr lang="en-US" dirty="0"/>
+          </a:p>
+        </p:txBody>
+      </p:sp>
+      <p:sp>
+        <p:nvSpPr>
+          <p:cNvPr id="4" name="Slide Number Placeholder 3"/>
+          <p:cNvSpPr>
+            <a:spLocks noGrp="1"/>
+          </p:cNvSpPr>
+          <p:nvPr>
+            <p:ph type="sldNum" sz="quarter" idx="10"/>
+          </p:nvPr>
+        </p:nvSpPr>
+        <p:spPr/>
+        <p:txBody>
+          <a:bodyPr/>
+          <a:lstStyle/>
+          <a:p>
+            <a:fld id="{7A15A026-3F06-481B-8588-1FF2E6F0F8AE}" type="slidenum">
+              <a:rPr lang="en-US" smtClean="0"/>
+              <a:t>47</a:t>
+            </a:fld>
+            <a:endParaRPr lang="en-US"/>
+          </a:p>
+        </p:txBody>
+      </p:sp>
+    </p:spTree>
+    <p:extLst>
+      <p:ext uri="{BB962C8B-B14F-4D97-AF65-F5344CB8AC3E}">
+        <p14:creationId xmlns:p14="http://schemas.microsoft.com/office/powerpoint/2010/main" val="274608097"/>
+      </p:ext>
+    </p:extLst>
+  </p:cSld>
+  <p:clrMapOvr>
+    <a:masterClrMapping/>
+  </p:clrMapOvr>
+</p:notes>
 </file>
 
 <file path=ppt/slideLayouts/slideLayout1.xml><?xml version="1.0" encoding="utf-8"?>
@@ -8178,7 +8624,7 @@
         </p:nvSpPr>
         <p:spPr>
           <a:xfrm>
-            <a:off x="6354231" y="1063229"/>
+            <a:off x="3180085" y="1200151"/>
             <a:ext cx="2628901" cy="3394472"/>
           </a:xfrm>
         </p:spPr>
@@ -8193,7 +8639,7 @@
             </a:pPr>
             <a:r>
               <a:rPr lang="en-US" dirty="0" smtClean="0"/>
-              <a:t>Model 14</a:t>
+              <a:t>Model 13</a:t>
             </a:r>
           </a:p>
           <a:p>
@@ -8249,7 +8695,7 @@
         </p:nvSpPr>
         <p:spPr>
           <a:xfrm>
-            <a:off x="3119967" y="1063229"/>
+            <a:off x="5926856" y="1247895"/>
             <a:ext cx="3124200" cy="3394472"/>
           </a:xfrm>
           <a:prstGeom prst="rect">
@@ -8403,7 +8849,7 @@
             </a:pPr>
             <a:r>
               <a:rPr lang="en-US" dirty="0" smtClean="0"/>
-              <a:t>Model 13</a:t>
+              <a:t>Model 14</a:t>
             </a:r>
           </a:p>
           <a:p>
@@ -8479,6 +8925,742 @@
     <p:extLst>
       <p:ext uri="{BB962C8B-B14F-4D97-AF65-F5344CB8AC3E}">
         <p14:creationId xmlns:p14="http://schemas.microsoft.com/office/powerpoint/2010/main" val="3433441230"/>
+      </p:ext>
+    </p:extLst>
+  </p:cSld>
+  <p:clrMapOvr>
+    <a:masterClrMapping/>
+  </p:clrMapOvr>
+  <p:timing>
+    <p:tnLst>
+      <p:par>
+        <p:cTn id="1" dur="indefinite" restart="never" nodeType="tmRoot"/>
+      </p:par>
+    </p:tnLst>
+  </p:timing>
+</p:sld>
+</file>
+
+<file path=ppt/slides/slide43.xml><?xml version="1.0" encoding="utf-8"?>
+<p:sld xmlns:a="http://schemas.openxmlformats.org/drawingml/2006/main" xmlns:r="http://schemas.openxmlformats.org/officeDocument/2006/relationships" xmlns:p="http://schemas.openxmlformats.org/presentationml/2006/main">
+  <p:cSld>
+    <p:spTree>
+      <p:nvGrpSpPr>
+        <p:cNvPr id="1" name=""/>
+        <p:cNvGrpSpPr/>
+        <p:nvPr/>
+      </p:nvGrpSpPr>
+      <p:grpSpPr>
+        <a:xfrm>
+          <a:off x="0" y="0"/>
+          <a:ext cx="0" cy="0"/>
+          <a:chOff x="0" y="0"/>
+          <a:chExt cx="0" cy="0"/>
+        </a:xfrm>
+      </p:grpSpPr>
+      <p:pic>
+        <p:nvPicPr>
+          <p:cNvPr id="5" name="Content Placeholder 4"/>
+          <p:cNvPicPr>
+            <a:picLocks noGrp="1" noChangeAspect="1"/>
+          </p:cNvPicPr>
+          <p:nvPr>
+            <p:ph sz="half" idx="1"/>
+          </p:nvPr>
+        </p:nvPicPr>
+        <p:blipFill>
+          <a:blip r:embed="rId2">
+            <a:extLst>
+              <a:ext uri="{28A0092B-C50C-407E-A947-70E740481C1C}">
+                <a14:useLocalDpi xmlns:a14="http://schemas.microsoft.com/office/drawing/2010/main" val="0"/>
+              </a:ext>
+            </a:extLst>
+          </a:blip>
+          <a:stretch>
+            <a:fillRect/>
+          </a:stretch>
+        </p:blipFill>
+        <p:spPr>
+          <a:xfrm>
+            <a:off x="2039604" y="155693"/>
+            <a:ext cx="4693291" cy="4693291"/>
+          </a:xfrm>
+        </p:spPr>
+      </p:pic>
+    </p:spTree>
+    <p:extLst>
+      <p:ext uri="{BB962C8B-B14F-4D97-AF65-F5344CB8AC3E}">
+        <p14:creationId xmlns:p14="http://schemas.microsoft.com/office/powerpoint/2010/main" val="362834173"/>
+      </p:ext>
+    </p:extLst>
+  </p:cSld>
+  <p:clrMapOvr>
+    <a:masterClrMapping/>
+  </p:clrMapOvr>
+</p:sld>
+</file>
+
+<file path=ppt/slides/slide44.xml><?xml version="1.0" encoding="utf-8"?>
+<p:sld xmlns:a="http://schemas.openxmlformats.org/drawingml/2006/main" xmlns:r="http://schemas.openxmlformats.org/officeDocument/2006/relationships" xmlns:p="http://schemas.openxmlformats.org/presentationml/2006/main">
+  <p:cSld>
+    <p:spTree>
+      <p:nvGrpSpPr>
+        <p:cNvPr id="1" name=""/>
+        <p:cNvGrpSpPr/>
+        <p:nvPr/>
+      </p:nvGrpSpPr>
+      <p:grpSpPr>
+        <a:xfrm>
+          <a:off x="0" y="0"/>
+          <a:ext cx="0" cy="0"/>
+          <a:chOff x="0" y="0"/>
+          <a:chExt cx="0" cy="0"/>
+        </a:xfrm>
+      </p:grpSpPr>
+      <p:pic>
+        <p:nvPicPr>
+          <p:cNvPr id="8" name="Picture 7"/>
+          <p:cNvPicPr>
+            <a:picLocks noChangeAspect="1"/>
+          </p:cNvPicPr>
+          <p:nvPr/>
+        </p:nvPicPr>
+        <p:blipFill>
+          <a:blip r:embed="rId2">
+            <a:extLst>
+              <a:ext uri="{28A0092B-C50C-407E-A947-70E740481C1C}">
+                <a14:useLocalDpi xmlns:a14="http://schemas.microsoft.com/office/drawing/2010/main" val="0"/>
+              </a:ext>
+            </a:extLst>
+          </a:blip>
+          <a:stretch>
+            <a:fillRect/>
+          </a:stretch>
+        </p:blipFill>
+        <p:spPr>
+          <a:xfrm>
+            <a:off x="2117301" y="130699"/>
+            <a:ext cx="4874901" cy="4874901"/>
+          </a:xfrm>
+          <a:prstGeom prst="rect">
+            <a:avLst/>
+          </a:prstGeom>
+        </p:spPr>
+      </p:pic>
+    </p:spTree>
+    <p:extLst>
+      <p:ext uri="{BB962C8B-B14F-4D97-AF65-F5344CB8AC3E}">
+        <p14:creationId xmlns:p14="http://schemas.microsoft.com/office/powerpoint/2010/main" val="2514554647"/>
+      </p:ext>
+    </p:extLst>
+  </p:cSld>
+  <p:clrMapOvr>
+    <a:masterClrMapping/>
+  </p:clrMapOvr>
+</p:sld>
+</file>
+
+<file path=ppt/slides/slide45.xml><?xml version="1.0" encoding="utf-8"?>
+<p:sld xmlns:a="http://schemas.openxmlformats.org/drawingml/2006/main" xmlns:r="http://schemas.openxmlformats.org/officeDocument/2006/relationships" xmlns:p="http://schemas.openxmlformats.org/presentationml/2006/main">
+  <p:cSld>
+    <p:spTree>
+      <p:nvGrpSpPr>
+        <p:cNvPr id="1" name=""/>
+        <p:cNvGrpSpPr/>
+        <p:nvPr/>
+      </p:nvGrpSpPr>
+      <p:grpSpPr>
+        <a:xfrm>
+          <a:off x="0" y="0"/>
+          <a:ext cx="0" cy="0"/>
+          <a:chOff x="0" y="0"/>
+          <a:chExt cx="0" cy="0"/>
+        </a:xfrm>
+      </p:grpSpPr>
+      <p:pic>
+        <p:nvPicPr>
+          <p:cNvPr id="6" name="Content Placeholder 5"/>
+          <p:cNvPicPr>
+            <a:picLocks noGrp="1" noChangeAspect="1"/>
+          </p:cNvPicPr>
+          <p:nvPr>
+            <p:ph sz="half" idx="2"/>
+          </p:nvPr>
+        </p:nvPicPr>
+        <p:blipFill>
+          <a:blip r:embed="rId2">
+            <a:extLst>
+              <a:ext uri="{28A0092B-C50C-407E-A947-70E740481C1C}">
+                <a14:useLocalDpi xmlns:a14="http://schemas.microsoft.com/office/drawing/2010/main" val="0"/>
+              </a:ext>
+            </a:extLst>
+          </a:blip>
+          <a:stretch>
+            <a:fillRect/>
+          </a:stretch>
+        </p:blipFill>
+        <p:spPr>
+          <a:xfrm>
+            <a:off x="2220037" y="355862"/>
+            <a:ext cx="4484024" cy="4484024"/>
+          </a:xfrm>
+        </p:spPr>
+      </p:pic>
+    </p:spTree>
+    <p:extLst>
+      <p:ext uri="{BB962C8B-B14F-4D97-AF65-F5344CB8AC3E}">
+        <p14:creationId xmlns:p14="http://schemas.microsoft.com/office/powerpoint/2010/main" val="1222825855"/>
+      </p:ext>
+    </p:extLst>
+  </p:cSld>
+  <p:clrMapOvr>
+    <a:masterClrMapping/>
+  </p:clrMapOvr>
+</p:sld>
+</file>
+
+<file path=ppt/slides/slide46.xml><?xml version="1.0" encoding="utf-8"?>
+<p:sld xmlns:a="http://schemas.openxmlformats.org/drawingml/2006/main" xmlns:r="http://schemas.openxmlformats.org/officeDocument/2006/relationships" xmlns:p="http://schemas.openxmlformats.org/presentationml/2006/main">
+  <p:cSld>
+    <p:spTree>
+      <p:nvGrpSpPr>
+        <p:cNvPr id="1" name=""/>
+        <p:cNvGrpSpPr/>
+        <p:nvPr/>
+      </p:nvGrpSpPr>
+      <p:grpSpPr>
+        <a:xfrm>
+          <a:off x="0" y="0"/>
+          <a:ext cx="0" cy="0"/>
+          <a:chOff x="0" y="0"/>
+          <a:chExt cx="0" cy="0"/>
+        </a:xfrm>
+      </p:grpSpPr>
+      <p:pic>
+        <p:nvPicPr>
+          <p:cNvPr id="6" name="Picture 5"/>
+          <p:cNvPicPr>
+            <a:picLocks noChangeAspect="1"/>
+          </p:cNvPicPr>
+          <p:nvPr/>
+        </p:nvPicPr>
+        <p:blipFill>
+          <a:blip r:embed="rId2">
+            <a:extLst>
+              <a:ext uri="{28A0092B-C50C-407E-A947-70E740481C1C}">
+                <a14:useLocalDpi xmlns:a14="http://schemas.microsoft.com/office/drawing/2010/main" val="0"/>
+              </a:ext>
+            </a:extLst>
+          </a:blip>
+          <a:stretch>
+            <a:fillRect/>
+          </a:stretch>
+        </p:blipFill>
+        <p:spPr>
+          <a:xfrm>
+            <a:off x="0" y="539750"/>
+            <a:ext cx="9144000" cy="4064000"/>
+          </a:xfrm>
+          <a:prstGeom prst="rect">
+            <a:avLst/>
+          </a:prstGeom>
+        </p:spPr>
+      </p:pic>
+    </p:spTree>
+    <p:extLst>
+      <p:ext uri="{BB962C8B-B14F-4D97-AF65-F5344CB8AC3E}">
+        <p14:creationId xmlns:p14="http://schemas.microsoft.com/office/powerpoint/2010/main" val="2383662858"/>
+      </p:ext>
+    </p:extLst>
+  </p:cSld>
+  <p:clrMapOvr>
+    <a:masterClrMapping/>
+  </p:clrMapOvr>
+</p:sld>
+</file>
+
+<file path=ppt/slides/slide47.xml><?xml version="1.0" encoding="utf-8"?>
+<p:sld xmlns:a="http://schemas.openxmlformats.org/drawingml/2006/main" xmlns:r="http://schemas.openxmlformats.org/officeDocument/2006/relationships" xmlns:p="http://schemas.openxmlformats.org/presentationml/2006/main">
+  <p:cSld>
+    <p:spTree>
+      <p:nvGrpSpPr>
+        <p:cNvPr id="1" name=""/>
+        <p:cNvGrpSpPr/>
+        <p:nvPr/>
+      </p:nvGrpSpPr>
+      <p:grpSpPr>
+        <a:xfrm>
+          <a:off x="0" y="0"/>
+          <a:ext cx="0" cy="0"/>
+          <a:chOff x="0" y="0"/>
+          <a:chExt cx="0" cy="0"/>
+        </a:xfrm>
+      </p:grpSpPr>
+      <p:sp>
+        <p:nvSpPr>
+          <p:cNvPr id="2" name="Title 1"/>
+          <p:cNvSpPr>
+            <a:spLocks noGrp="1"/>
+          </p:cNvSpPr>
+          <p:nvPr>
+            <p:ph type="title"/>
+          </p:nvPr>
+        </p:nvSpPr>
+        <p:spPr/>
+        <p:txBody>
+          <a:bodyPr/>
+          <a:lstStyle/>
+          <a:p>
+            <a:r>
+              <a:rPr lang="en-US" dirty="0" smtClean="0"/>
+              <a:t>April 14 next steps</a:t>
+            </a:r>
+            <a:endParaRPr lang="en-US" dirty="0"/>
+          </a:p>
+        </p:txBody>
+      </p:sp>
+      <p:sp>
+        <p:nvSpPr>
+          <p:cNvPr id="3" name="Content Placeholder 2"/>
+          <p:cNvSpPr>
+            <a:spLocks noGrp="1"/>
+          </p:cNvSpPr>
+          <p:nvPr>
+            <p:ph sz="half" idx="1"/>
+          </p:nvPr>
+        </p:nvSpPr>
+        <p:spPr/>
+        <p:txBody>
+          <a:bodyPr>
+            <a:normAutofit fontScale="92500" lnSpcReduction="20000"/>
+          </a:bodyPr>
+          <a:lstStyle/>
+          <a:p>
+            <a:r>
+              <a:rPr lang="en-US" dirty="0" smtClean="0"/>
+              <a:t>Models 12 and 13 and 7</a:t>
+            </a:r>
+          </a:p>
+          <a:p>
+            <a:r>
+              <a:rPr lang="en-US" dirty="0" smtClean="0"/>
+              <a:t>Runs Tests</a:t>
+            </a:r>
+          </a:p>
+          <a:p>
+            <a:r>
+              <a:rPr lang="en-US" dirty="0" smtClean="0"/>
+              <a:t>Run R0 profile</a:t>
+            </a:r>
+          </a:p>
+          <a:p>
+            <a:r>
+              <a:rPr lang="en-US" dirty="0" smtClean="0"/>
+              <a:t>Run ASPM</a:t>
+            </a:r>
+          </a:p>
+          <a:p>
+            <a:endParaRPr lang="en-US" dirty="0"/>
+          </a:p>
+          <a:p>
+            <a:r>
+              <a:rPr lang="en-US" dirty="0" smtClean="0"/>
+              <a:t>Model 7 – lognormal selectivity on TWN and IATTC</a:t>
+            </a:r>
+          </a:p>
+          <a:p>
+            <a:r>
+              <a:rPr lang="en-US" dirty="0" smtClean="0"/>
+              <a:t>Estimate </a:t>
+            </a:r>
+            <a:r>
+              <a:rPr lang="en-US" dirty="0" err="1" smtClean="0"/>
+              <a:t>equ</a:t>
+            </a:r>
+            <a:r>
+              <a:rPr lang="en-US" dirty="0" smtClean="0"/>
+              <a:t> catch</a:t>
+            </a:r>
+          </a:p>
+          <a:p>
+            <a:r>
+              <a:rPr lang="en-US" dirty="0" smtClean="0"/>
+              <a:t>Amin = 1 </a:t>
+            </a:r>
+            <a:r>
+              <a:rPr lang="en-US" dirty="0" err="1" smtClean="0"/>
+              <a:t>yr</a:t>
+            </a:r>
+            <a:endParaRPr lang="en-US" dirty="0" smtClean="0"/>
+          </a:p>
+          <a:p>
+            <a:r>
+              <a:rPr lang="en-US" dirty="0" smtClean="0"/>
+              <a:t>Include F9 size comp as one fleet</a:t>
+            </a:r>
+          </a:p>
+          <a:p>
+            <a:r>
+              <a:rPr lang="en-US" dirty="0" smtClean="0"/>
+              <a:t>Include S4 and S8</a:t>
+            </a:r>
+          </a:p>
+          <a:p>
+            <a:endParaRPr lang="en-US" dirty="0"/>
+          </a:p>
+        </p:txBody>
+      </p:sp>
+      <p:sp>
+        <p:nvSpPr>
+          <p:cNvPr id="4" name="Content Placeholder 3"/>
+          <p:cNvSpPr>
+            <a:spLocks noGrp="1"/>
+          </p:cNvSpPr>
+          <p:nvPr>
+            <p:ph sz="half" idx="2"/>
+          </p:nvPr>
+        </p:nvSpPr>
+        <p:spPr/>
+        <p:txBody>
+          <a:bodyPr>
+            <a:normAutofit fontScale="92500" lnSpcReduction="20000"/>
+          </a:bodyPr>
+          <a:lstStyle/>
+          <a:p>
+            <a:r>
+              <a:rPr lang="en-US" dirty="0" smtClean="0"/>
+              <a:t>To plot ASPM and runs test diagnostics:</a:t>
+            </a:r>
+          </a:p>
+          <a:p>
+            <a:r>
+              <a:rPr lang="en-US" dirty="0" smtClean="0"/>
+              <a:t>Go to </a:t>
+            </a:r>
+            <a:r>
+              <a:rPr lang="en-US" dirty="0" err="1" smtClean="0"/>
+              <a:t>Rscripts</a:t>
+            </a:r>
+            <a:r>
+              <a:rPr lang="en-US" dirty="0" smtClean="0"/>
+              <a:t> folder on </a:t>
+            </a:r>
+            <a:r>
+              <a:rPr lang="en-US" dirty="0" err="1" smtClean="0"/>
+              <a:t>github</a:t>
+            </a:r>
+            <a:endParaRPr lang="en-US" dirty="0" smtClean="0"/>
+          </a:p>
+          <a:p>
+            <a:r>
+              <a:rPr lang="en-US" dirty="0" smtClean="0"/>
+              <a:t>Open 001_LoadModel.R</a:t>
+            </a:r>
+          </a:p>
+          <a:p>
+            <a:pPr lvl="1"/>
+            <a:r>
+              <a:rPr lang="en-US" dirty="0" smtClean="0"/>
+              <a:t>Change directories for </a:t>
+            </a:r>
+            <a:r>
+              <a:rPr lang="en-US" dirty="0" err="1" smtClean="0"/>
+              <a:t>base.dir</a:t>
+            </a:r>
+            <a:r>
+              <a:rPr lang="en-US" dirty="0" smtClean="0"/>
+              <a:t> and </a:t>
+            </a:r>
+            <a:r>
+              <a:rPr lang="en-US" dirty="0" err="1" smtClean="0"/>
+              <a:t>current.dir</a:t>
+            </a:r>
+            <a:r>
+              <a:rPr lang="en-US" dirty="0" smtClean="0"/>
+              <a:t> to your directories</a:t>
+            </a:r>
+          </a:p>
+          <a:p>
+            <a:pPr lvl="1"/>
+            <a:r>
+              <a:rPr lang="en-US" dirty="0" smtClean="0"/>
+              <a:t>Run 001_LoadModel.R</a:t>
+            </a:r>
+          </a:p>
+          <a:p>
+            <a:pPr lvl="1"/>
+            <a:r>
+              <a:rPr lang="en-US" dirty="0" smtClean="0"/>
+              <a:t>Run 002_SummaryFigs.R</a:t>
+            </a:r>
+          </a:p>
+          <a:p>
+            <a:pPr lvl="2"/>
+            <a:r>
+              <a:rPr lang="en-US" dirty="0" smtClean="0"/>
+              <a:t>Summary figs are saved to a variable to be printed whenever needed</a:t>
+            </a:r>
+          </a:p>
+          <a:p>
+            <a:pPr lvl="1"/>
+            <a:r>
+              <a:rPr lang="en-US" dirty="0" smtClean="0"/>
+              <a:t>Run 005_DiagnosticPlots.R</a:t>
+            </a:r>
+          </a:p>
+          <a:p>
+            <a:pPr lvl="2"/>
+            <a:r>
+              <a:rPr lang="en-US" dirty="0" smtClean="0"/>
+              <a:t>Plots will be saved to your </a:t>
+            </a:r>
+            <a:r>
+              <a:rPr lang="en-US" dirty="0" err="1" smtClean="0"/>
+              <a:t>plot.dir</a:t>
+            </a:r>
+            <a:r>
+              <a:rPr lang="en-US" dirty="0" smtClean="0"/>
+              <a:t> set in 001_LoadModel.R</a:t>
+            </a:r>
+          </a:p>
+        </p:txBody>
+      </p:sp>
+    </p:spTree>
+    <p:extLst>
+      <p:ext uri="{BB962C8B-B14F-4D97-AF65-F5344CB8AC3E}">
+        <p14:creationId xmlns:p14="http://schemas.microsoft.com/office/powerpoint/2010/main" val="3428084388"/>
+      </p:ext>
+    </p:extLst>
+  </p:cSld>
+  <p:clrMapOvr>
+    <a:masterClrMapping/>
+  </p:clrMapOvr>
+</p:sld>
+</file>
+
+<file path=ppt/slides/slide48.xml><?xml version="1.0" encoding="utf-8"?>
+<p:sld xmlns:a="http://schemas.openxmlformats.org/drawingml/2006/main" xmlns:r="http://schemas.openxmlformats.org/officeDocument/2006/relationships" xmlns:p="http://schemas.openxmlformats.org/presentationml/2006/main">
+  <p:cSld>
+    <p:spTree>
+      <p:nvGrpSpPr>
+        <p:cNvPr id="1" name=""/>
+        <p:cNvGrpSpPr/>
+        <p:nvPr/>
+      </p:nvGrpSpPr>
+      <p:grpSpPr>
+        <a:xfrm>
+          <a:off x="0" y="0"/>
+          <a:ext cx="0" cy="0"/>
+          <a:chOff x="0" y="0"/>
+          <a:chExt cx="0" cy="0"/>
+        </a:xfrm>
+      </p:grpSpPr>
+      <p:sp>
+        <p:nvSpPr>
+          <p:cNvPr id="2" name="Title 1"/>
+          <p:cNvSpPr>
+            <a:spLocks noGrp="1"/>
+          </p:cNvSpPr>
+          <p:nvPr>
+            <p:ph type="title"/>
+          </p:nvPr>
+        </p:nvSpPr>
+        <p:spPr/>
+        <p:txBody>
+          <a:bodyPr/>
+          <a:lstStyle/>
+          <a:p>
+            <a:r>
+              <a:rPr lang="en-US" dirty="0" smtClean="0"/>
+              <a:t>Model 7 likelihood</a:t>
+            </a:r>
+            <a:endParaRPr lang="en-US" dirty="0"/>
+          </a:p>
+        </p:txBody>
+      </p:sp>
+      <p:pic>
+        <p:nvPicPr>
+          <p:cNvPr id="5" name="Content Placeholder 4"/>
+          <p:cNvPicPr>
+            <a:picLocks noGrp="1" noChangeAspect="1"/>
+          </p:cNvPicPr>
+          <p:nvPr>
+            <p:ph sz="half" idx="1"/>
+          </p:nvPr>
+        </p:nvPicPr>
+        <p:blipFill>
+          <a:blip r:embed="rId2">
+            <a:extLst>
+              <a:ext uri="{28A0092B-C50C-407E-A947-70E740481C1C}">
+                <a14:useLocalDpi xmlns:a14="http://schemas.microsoft.com/office/drawing/2010/main" val="0"/>
+              </a:ext>
+            </a:extLst>
+          </a:blip>
+          <a:stretch>
+            <a:fillRect/>
+          </a:stretch>
+        </p:blipFill>
+        <p:spPr>
+          <a:xfrm>
+            <a:off x="779462" y="1200150"/>
+            <a:ext cx="3394075" cy="3394075"/>
+          </a:xfrm>
+        </p:spPr>
+      </p:pic>
+      <p:pic>
+        <p:nvPicPr>
+          <p:cNvPr id="6" name="Content Placeholder 5"/>
+          <p:cNvPicPr>
+            <a:picLocks noGrp="1" noChangeAspect="1"/>
+          </p:cNvPicPr>
+          <p:nvPr>
+            <p:ph sz="half" idx="2"/>
+          </p:nvPr>
+        </p:nvPicPr>
+        <p:blipFill>
+          <a:blip r:embed="rId3">
+            <a:extLst>
+              <a:ext uri="{28A0092B-C50C-407E-A947-70E740481C1C}">
+                <a14:useLocalDpi xmlns:a14="http://schemas.microsoft.com/office/drawing/2010/main" val="0"/>
+              </a:ext>
+            </a:extLst>
+          </a:blip>
+          <a:stretch>
+            <a:fillRect/>
+          </a:stretch>
+        </p:blipFill>
+        <p:spPr>
+          <a:xfrm>
+            <a:off x="4970462" y="1200150"/>
+            <a:ext cx="3394075" cy="3394075"/>
+          </a:xfrm>
+        </p:spPr>
+      </p:pic>
+    </p:spTree>
+    <p:extLst>
+      <p:ext uri="{BB962C8B-B14F-4D97-AF65-F5344CB8AC3E}">
+        <p14:creationId xmlns:p14="http://schemas.microsoft.com/office/powerpoint/2010/main" val="2092387424"/>
+      </p:ext>
+    </p:extLst>
+  </p:cSld>
+  <p:clrMapOvr>
+    <a:masterClrMapping/>
+  </p:clrMapOvr>
+  <p:timing>
+    <p:tnLst>
+      <p:par>
+        <p:cTn id="1" dur="indefinite" restart="never" nodeType="tmRoot"/>
+      </p:par>
+    </p:tnLst>
+  </p:timing>
+</p:sld>
+</file>
+
+<file path=ppt/slides/slide49.xml><?xml version="1.0" encoding="utf-8"?>
+<p:sld xmlns:a="http://schemas.openxmlformats.org/drawingml/2006/main" xmlns:r="http://schemas.openxmlformats.org/officeDocument/2006/relationships" xmlns:p="http://schemas.openxmlformats.org/presentationml/2006/main">
+  <p:cSld>
+    <p:spTree>
+      <p:nvGrpSpPr>
+        <p:cNvPr id="1" name=""/>
+        <p:cNvGrpSpPr/>
+        <p:nvPr/>
+      </p:nvGrpSpPr>
+      <p:grpSpPr>
+        <a:xfrm>
+          <a:off x="0" y="0"/>
+          <a:ext cx="0" cy="0"/>
+          <a:chOff x="0" y="0"/>
+          <a:chExt cx="0" cy="0"/>
+        </a:xfrm>
+      </p:grpSpPr>
+      <p:sp>
+        <p:nvSpPr>
+          <p:cNvPr id="2" name="Title 1"/>
+          <p:cNvSpPr>
+            <a:spLocks noGrp="1"/>
+          </p:cNvSpPr>
+          <p:nvPr>
+            <p:ph type="title"/>
+          </p:nvPr>
+        </p:nvSpPr>
+        <p:spPr/>
+        <p:txBody>
+          <a:bodyPr>
+            <a:normAutofit/>
+          </a:bodyPr>
+          <a:lstStyle/>
+          <a:p>
+            <a:r>
+              <a:rPr lang="en-US" dirty="0" smtClean="0"/>
+              <a:t>Model 7 likelihood and ASPM</a:t>
+            </a:r>
+            <a:endParaRPr lang="en-US" dirty="0"/>
+          </a:p>
+        </p:txBody>
+      </p:sp>
+      <p:pic>
+        <p:nvPicPr>
+          <p:cNvPr id="5" name="Content Placeholder 4"/>
+          <p:cNvPicPr>
+            <a:picLocks noGrp="1" noChangeAspect="1"/>
+          </p:cNvPicPr>
+          <p:nvPr>
+            <p:ph sz="half" idx="1"/>
+          </p:nvPr>
+        </p:nvPicPr>
+        <p:blipFill>
+          <a:blip r:embed="rId2">
+            <a:extLst>
+              <a:ext uri="{28A0092B-C50C-407E-A947-70E740481C1C}">
+                <a14:useLocalDpi xmlns:a14="http://schemas.microsoft.com/office/drawing/2010/main" val="0"/>
+              </a:ext>
+            </a:extLst>
+          </a:blip>
+          <a:stretch>
+            <a:fillRect/>
+          </a:stretch>
+        </p:blipFill>
+        <p:spPr>
+          <a:xfrm>
+            <a:off x="779462" y="1200150"/>
+            <a:ext cx="3394075" cy="3394075"/>
+          </a:xfrm>
+        </p:spPr>
+      </p:pic>
+      <p:pic>
+        <p:nvPicPr>
+          <p:cNvPr id="7" name="Picture 6"/>
+          <p:cNvPicPr>
+            <a:picLocks noChangeAspect="1"/>
+          </p:cNvPicPr>
+          <p:nvPr/>
+        </p:nvPicPr>
+        <p:blipFill>
+          <a:blip r:embed="rId3">
+            <a:extLst>
+              <a:ext uri="{28A0092B-C50C-407E-A947-70E740481C1C}">
+                <a14:useLocalDpi xmlns:a14="http://schemas.microsoft.com/office/drawing/2010/main" val="0"/>
+              </a:ext>
+            </a:extLst>
+          </a:blip>
+          <a:stretch>
+            <a:fillRect/>
+          </a:stretch>
+        </p:blipFill>
+        <p:spPr>
+          <a:xfrm>
+            <a:off x="4289021" y="1765109"/>
+            <a:ext cx="4554727" cy="2024323"/>
+          </a:xfrm>
+          <a:prstGeom prst="rect">
+            <a:avLst/>
+          </a:prstGeom>
+        </p:spPr>
+      </p:pic>
+    </p:spTree>
+    <p:extLst>
+      <p:ext uri="{BB962C8B-B14F-4D97-AF65-F5344CB8AC3E}">
+        <p14:creationId xmlns:p14="http://schemas.microsoft.com/office/powerpoint/2010/main" val="2514271827"/>
       </p:ext>
     </p:extLst>
   </p:cSld>
@@ -8573,6 +9755,349 @@
         </p:spPr>
       </p:pic>
     </p:spTree>
+  </p:cSld>
+  <p:clrMapOvr>
+    <a:masterClrMapping/>
+  </p:clrMapOvr>
+  <p:timing>
+    <p:tnLst>
+      <p:par>
+        <p:cTn id="1" dur="indefinite" restart="never" nodeType="tmRoot"/>
+      </p:par>
+    </p:tnLst>
+  </p:timing>
+</p:sld>
+</file>
+
+<file path=ppt/slides/slide50.xml><?xml version="1.0" encoding="utf-8"?>
+<p:sld xmlns:a="http://schemas.openxmlformats.org/drawingml/2006/main" xmlns:r="http://schemas.openxmlformats.org/officeDocument/2006/relationships" xmlns:p="http://schemas.openxmlformats.org/presentationml/2006/main">
+  <p:cSld>
+    <p:spTree>
+      <p:nvGrpSpPr>
+        <p:cNvPr id="1" name=""/>
+        <p:cNvGrpSpPr/>
+        <p:nvPr/>
+      </p:nvGrpSpPr>
+      <p:grpSpPr>
+        <a:xfrm>
+          <a:off x="0" y="0"/>
+          <a:ext cx="0" cy="0"/>
+          <a:chOff x="0" y="0"/>
+          <a:chExt cx="0" cy="0"/>
+        </a:xfrm>
+      </p:grpSpPr>
+      <p:sp>
+        <p:nvSpPr>
+          <p:cNvPr id="2" name="Title 1"/>
+          <p:cNvSpPr>
+            <a:spLocks noGrp="1"/>
+          </p:cNvSpPr>
+          <p:nvPr>
+            <p:ph type="title"/>
+          </p:nvPr>
+        </p:nvSpPr>
+        <p:spPr>
+          <a:xfrm>
+            <a:off x="403545" y="8003"/>
+            <a:ext cx="8229600" cy="599205"/>
+          </a:xfrm>
+        </p:spPr>
+        <p:txBody>
+          <a:bodyPr/>
+          <a:lstStyle/>
+          <a:p>
+            <a:r>
+              <a:rPr lang="en-US" dirty="0" smtClean="0"/>
+              <a:t>Model 7 Runs test</a:t>
+            </a:r>
+            <a:endParaRPr lang="en-US" dirty="0"/>
+          </a:p>
+        </p:txBody>
+      </p:sp>
+      <p:pic>
+        <p:nvPicPr>
+          <p:cNvPr id="5" name="Content Placeholder 4"/>
+          <p:cNvPicPr>
+            <a:picLocks noGrp="1" noChangeAspect="1"/>
+          </p:cNvPicPr>
+          <p:nvPr>
+            <p:ph sz="half" idx="1"/>
+          </p:nvPr>
+        </p:nvPicPr>
+        <p:blipFill>
+          <a:blip r:embed="rId2">
+            <a:extLst>
+              <a:ext uri="{28A0092B-C50C-407E-A947-70E740481C1C}">
+                <a14:useLocalDpi xmlns:a14="http://schemas.microsoft.com/office/drawing/2010/main" val="0"/>
+              </a:ext>
+            </a:extLst>
+          </a:blip>
+          <a:stretch>
+            <a:fillRect/>
+          </a:stretch>
+        </p:blipFill>
+        <p:spPr>
+          <a:xfrm>
+            <a:off x="63690" y="607208"/>
+            <a:ext cx="4400999" cy="4400999"/>
+          </a:xfrm>
+        </p:spPr>
+      </p:pic>
+      <p:pic>
+        <p:nvPicPr>
+          <p:cNvPr id="6" name="Content Placeholder 5"/>
+          <p:cNvPicPr>
+            <a:picLocks noGrp="1" noChangeAspect="1"/>
+          </p:cNvPicPr>
+          <p:nvPr>
+            <p:ph sz="half" idx="2"/>
+          </p:nvPr>
+        </p:nvPicPr>
+        <p:blipFill>
+          <a:blip r:embed="rId3">
+            <a:extLst>
+              <a:ext uri="{28A0092B-C50C-407E-A947-70E740481C1C}">
+                <a14:useLocalDpi xmlns:a14="http://schemas.microsoft.com/office/drawing/2010/main" val="0"/>
+              </a:ext>
+            </a:extLst>
+          </a:blip>
+          <a:stretch>
+            <a:fillRect/>
+          </a:stretch>
+        </p:blipFill>
+        <p:spPr>
+          <a:xfrm>
+            <a:off x="4572000" y="607208"/>
+            <a:ext cx="4400999" cy="4400999"/>
+          </a:xfrm>
+        </p:spPr>
+      </p:pic>
+    </p:spTree>
+    <p:extLst>
+      <p:ext uri="{BB962C8B-B14F-4D97-AF65-F5344CB8AC3E}">
+        <p14:creationId xmlns:p14="http://schemas.microsoft.com/office/powerpoint/2010/main" val="3102949460"/>
+      </p:ext>
+    </p:extLst>
+  </p:cSld>
+  <p:clrMapOvr>
+    <a:masterClrMapping/>
+  </p:clrMapOvr>
+  <p:timing>
+    <p:tnLst>
+      <p:par>
+        <p:cTn id="1" dur="indefinite" restart="never" nodeType="tmRoot"/>
+      </p:par>
+    </p:tnLst>
+  </p:timing>
+</p:sld>
+</file>
+
+<file path=ppt/slides/slide51.xml><?xml version="1.0" encoding="utf-8"?>
+<p:sld xmlns:a="http://schemas.openxmlformats.org/drawingml/2006/main" xmlns:r="http://schemas.openxmlformats.org/officeDocument/2006/relationships" xmlns:p="http://schemas.openxmlformats.org/presentationml/2006/main">
+  <p:cSld>
+    <p:spTree>
+      <p:nvGrpSpPr>
+        <p:cNvPr id="1" name=""/>
+        <p:cNvGrpSpPr/>
+        <p:nvPr/>
+      </p:nvGrpSpPr>
+      <p:grpSpPr>
+        <a:xfrm>
+          <a:off x="0" y="0"/>
+          <a:ext cx="0" cy="0"/>
+          <a:chOff x="0" y="0"/>
+          <a:chExt cx="0" cy="0"/>
+        </a:xfrm>
+      </p:grpSpPr>
+      <p:sp>
+        <p:nvSpPr>
+          <p:cNvPr id="5" name="Title 4"/>
+          <p:cNvSpPr>
+            <a:spLocks noGrp="1"/>
+          </p:cNvSpPr>
+          <p:nvPr>
+            <p:ph type="title"/>
+          </p:nvPr>
+        </p:nvSpPr>
+        <p:spPr/>
+        <p:txBody>
+          <a:bodyPr/>
+          <a:lstStyle/>
+          <a:p>
+            <a:r>
+              <a:rPr lang="en-US" dirty="0" smtClean="0"/>
+              <a:t>Comparisons Summary</a:t>
+            </a:r>
+            <a:endParaRPr lang="en-US" dirty="0"/>
+          </a:p>
+        </p:txBody>
+      </p:sp>
+      <p:sp>
+        <p:nvSpPr>
+          <p:cNvPr id="9" name="Content Placeholder 8"/>
+          <p:cNvSpPr>
+            <a:spLocks noGrp="1"/>
+          </p:cNvSpPr>
+          <p:nvPr>
+            <p:ph sz="quarter" idx="4"/>
+          </p:nvPr>
+        </p:nvSpPr>
+        <p:spPr>
+          <a:xfrm>
+            <a:off x="555010" y="1123665"/>
+            <a:ext cx="8131792" cy="3844119"/>
+          </a:xfrm>
+        </p:spPr>
+        <p:txBody>
+          <a:bodyPr>
+            <a:normAutofit fontScale="85000" lnSpcReduction="10000"/>
+          </a:bodyPr>
+          <a:lstStyle/>
+          <a:p>
+            <a:r>
+              <a:rPr lang="en-US" dirty="0" smtClean="0"/>
+              <a:t>TWN size comp selectivity </a:t>
+            </a:r>
+          </a:p>
+          <a:p>
+            <a:pPr lvl="1"/>
+            <a:r>
+              <a:rPr lang="en-US" dirty="0" smtClean="0"/>
+              <a:t>Asymptotic logistic (Model 7) – fails runs test (p-value = 0.01) BUT more curve in likelihood profile &gt;MLE</a:t>
+            </a:r>
+          </a:p>
+          <a:p>
+            <a:pPr lvl="1"/>
+            <a:r>
+              <a:rPr lang="en-US" dirty="0" smtClean="0"/>
+              <a:t>Double normal (Models 12 and 13) – passes runs test (p-values =  but flat likelihood profile &gt;MLE</a:t>
+            </a:r>
+          </a:p>
+          <a:p>
+            <a:pPr lvl="1"/>
+            <a:endParaRPr lang="en-US" dirty="0"/>
+          </a:p>
+          <a:p>
+            <a:r>
+              <a:rPr lang="en-US" dirty="0" smtClean="0"/>
+              <a:t>Amin/</a:t>
+            </a:r>
+            <a:r>
+              <a:rPr lang="en-US" dirty="0" err="1" smtClean="0"/>
+              <a:t>Lmin</a:t>
+            </a:r>
+            <a:r>
+              <a:rPr lang="en-US" dirty="0" smtClean="0"/>
+              <a:t> setting</a:t>
+            </a:r>
+          </a:p>
+          <a:p>
+            <a:pPr lvl="1"/>
+            <a:r>
+              <a:rPr lang="en-US" dirty="0" smtClean="0"/>
+              <a:t>Amin = 0.5 </a:t>
+            </a:r>
+            <a:r>
+              <a:rPr lang="en-US" dirty="0" err="1" smtClean="0"/>
+              <a:t>yr</a:t>
+            </a:r>
+            <a:r>
+              <a:rPr lang="en-US" dirty="0" smtClean="0"/>
+              <a:t> – IATTC size comp data passes runs test (p-value = 0.135), but larger overall likelihood (342)</a:t>
+            </a:r>
+          </a:p>
+          <a:p>
+            <a:pPr lvl="1"/>
+            <a:r>
+              <a:rPr lang="en-US" dirty="0" smtClean="0"/>
+              <a:t>Amin = 1.0 </a:t>
+            </a:r>
+            <a:r>
+              <a:rPr lang="en-US" dirty="0" err="1" smtClean="0"/>
+              <a:t>yr</a:t>
+            </a:r>
+            <a:r>
+              <a:rPr lang="en-US" dirty="0" smtClean="0"/>
+              <a:t> – IATTC size comp data fails runs test (p-value =0.043) but smaller overall likelihood (289)</a:t>
+            </a:r>
+          </a:p>
+          <a:p>
+            <a:pPr lvl="1"/>
+            <a:endParaRPr lang="en-US" dirty="0"/>
+          </a:p>
+          <a:p>
+            <a:r>
+              <a:rPr lang="en-US" dirty="0" smtClean="0"/>
+              <a:t>Have agreed upon:</a:t>
+            </a:r>
+          </a:p>
+          <a:p>
+            <a:pPr lvl="1"/>
+            <a:r>
+              <a:rPr lang="en-US" dirty="0" smtClean="0"/>
+              <a:t>Dropping F9 size data</a:t>
+            </a:r>
+          </a:p>
+          <a:p>
+            <a:pPr lvl="1"/>
+            <a:r>
+              <a:rPr lang="en-US" dirty="0" smtClean="0"/>
+              <a:t>Dropping S4 and S8</a:t>
+            </a:r>
+          </a:p>
+          <a:p>
+            <a:pPr lvl="1"/>
+            <a:r>
+              <a:rPr lang="en-US" dirty="0" smtClean="0"/>
+              <a:t>IATTC size comp asymptotic logistic selectivity</a:t>
+            </a:r>
+          </a:p>
+          <a:p>
+            <a:pPr lvl="1"/>
+            <a:r>
+              <a:rPr lang="en-US" dirty="0" smtClean="0"/>
+              <a:t>Estimate </a:t>
+            </a:r>
+            <a:r>
+              <a:rPr lang="en-US" dirty="0" err="1" smtClean="0"/>
+              <a:t>equ</a:t>
+            </a:r>
+            <a:r>
+              <a:rPr lang="en-US" dirty="0" smtClean="0"/>
+              <a:t> catch</a:t>
+            </a:r>
+          </a:p>
+          <a:p>
+            <a:pPr lvl="1"/>
+            <a:r>
+              <a:rPr lang="en-US" dirty="0" smtClean="0"/>
+              <a:t>Amin = 0.5 </a:t>
+            </a:r>
+            <a:r>
+              <a:rPr lang="en-US" dirty="0" err="1" smtClean="0"/>
+              <a:t>yr</a:t>
+            </a:r>
+            <a:endParaRPr lang="en-US" dirty="0" smtClean="0"/>
+          </a:p>
+          <a:p>
+            <a:pPr lvl="1"/>
+            <a:r>
+              <a:rPr lang="en-US" dirty="0" smtClean="0"/>
+              <a:t>Asymptotic logistic (model 15) TWN selectivity if R0 profile improves, otherwise Double normal (model 12)</a:t>
+            </a:r>
+          </a:p>
+          <a:p>
+            <a:pPr lvl="1"/>
+            <a:endParaRPr lang="en-US" dirty="0"/>
+          </a:p>
+        </p:txBody>
+      </p:sp>
+    </p:spTree>
+    <p:extLst>
+      <p:ext uri="{BB962C8B-B14F-4D97-AF65-F5344CB8AC3E}">
+        <p14:creationId xmlns:p14="http://schemas.microsoft.com/office/powerpoint/2010/main" val="319277322"/>
+      </p:ext>
+    </p:extLst>
   </p:cSld>
   <p:clrMapOvr>
     <a:masterClrMapping/>
@@ -9393,4 +10918,265 @@
   </a:objectDefaults>
   <a:extraClrSchemeLst/>
 </a:theme>
+</file>
+
+<file path=ppt/theme/theme2.xml><?xml version="1.0" encoding="utf-8"?>
+<a:theme xmlns:a="http://schemas.openxmlformats.org/drawingml/2006/main" name="Office Theme">
+  <a:themeElements>
+    <a:clrScheme name="Office">
+      <a:dk1>
+        <a:sysClr val="windowText" lastClr="000000"/>
+      </a:dk1>
+      <a:lt1>
+        <a:sysClr val="window" lastClr="FFFFFF"/>
+      </a:lt1>
+      <a:dk2>
+        <a:srgbClr val="44546A"/>
+      </a:dk2>
+      <a:lt2>
+        <a:srgbClr val="E7E6E6"/>
+      </a:lt2>
+      <a:accent1>
+        <a:srgbClr val="5B9BD5"/>
+      </a:accent1>
+      <a:accent2>
+        <a:srgbClr val="ED7D31"/>
+      </a:accent2>
+      <a:accent3>
+        <a:srgbClr val="A5A5A5"/>
+      </a:accent3>
+      <a:accent4>
+        <a:srgbClr val="FFC000"/>
+      </a:accent4>
+      <a:accent5>
+        <a:srgbClr val="4472C4"/>
+      </a:accent5>
+      <a:accent6>
+        <a:srgbClr val="70AD47"/>
+      </a:accent6>
+      <a:hlink>
+        <a:srgbClr val="0563C1"/>
+      </a:hlink>
+      <a:folHlink>
+        <a:srgbClr val="954F72"/>
+      </a:folHlink>
+    </a:clrScheme>
+    <a:fontScheme name="Office">
+      <a:majorFont>
+        <a:latin typeface="Calibri Light" panose="020F0302020204030204"/>
+        <a:ea typeface=""/>
+        <a:cs typeface=""/>
+        <a:font script="Jpan" typeface="游ゴシック Light"/>
+        <a:font script="Hang" typeface="맑은 고딕"/>
+        <a:font script="Hans" typeface="等线 Light"/>
+        <a:font script="Hant" typeface="新細明體"/>
+        <a:font script="Arab" typeface="Times New Roman"/>
+        <a:font script="Hebr" typeface="Times New Roman"/>
+        <a:font script="Thai" typeface="Angsana New"/>
+        <a:font script="Ethi" typeface="Nyala"/>
+        <a:font script="Beng" typeface="Vrinda"/>
+        <a:font script="Gujr" typeface="Shruti"/>
+        <a:font script="Khmr" typeface="MoolBoran"/>
+        <a:font script="Knda" typeface="Tunga"/>
+        <a:font script="Guru" typeface="Raavi"/>
+        <a:font script="Cans" typeface="Euphemia"/>
+        <a:font script="Cher" typeface="Plantagenet Cherokee"/>
+        <a:font script="Yiii" typeface="Microsoft Yi Baiti"/>
+        <a:font script="Tibt" typeface="Microsoft Himalaya"/>
+        <a:font script="Thaa" typeface="MV Boli"/>
+        <a:font script="Deva" typeface="Mangal"/>
+        <a:font script="Telu" typeface="Gautami"/>
+        <a:font script="Taml" typeface="Latha"/>
+        <a:font script="Syrc" typeface="Estrangelo Edessa"/>
+        <a:font script="Orya" typeface="Kalinga"/>
+        <a:font script="Mlym" typeface="Kartika"/>
+        <a:font script="Laoo" typeface="DokChampa"/>
+        <a:font script="Sinh" typeface="Iskoola Pota"/>
+        <a:font script="Mong" typeface="Mongolian Baiti"/>
+        <a:font script="Viet" typeface="Times New Roman"/>
+        <a:font script="Uigh" typeface="Microsoft Uighur"/>
+        <a:font script="Geor" typeface="Sylfaen"/>
+      </a:majorFont>
+      <a:minorFont>
+        <a:latin typeface="Calibri" panose="020F0502020204030204"/>
+        <a:ea typeface=""/>
+        <a:cs typeface=""/>
+        <a:font script="Jpan" typeface="游ゴシック"/>
+        <a:font script="Hang" typeface="맑은 고딕"/>
+        <a:font script="Hans" typeface="等线"/>
+        <a:font script="Hant" typeface="新細明體"/>
+        <a:font script="Arab" typeface="Arial"/>
+        <a:font script="Hebr" typeface="Arial"/>
+        <a:font script="Thai" typeface="Cordia New"/>
+        <a:font script="Ethi" typeface="Nyala"/>
+        <a:font script="Beng" typeface="Vrinda"/>
+        <a:font script="Gujr" typeface="Shruti"/>
+        <a:font script="Khmr" typeface="DaunPenh"/>
+        <a:font script="Knda" typeface="Tunga"/>
+        <a:font script="Guru" typeface="Raavi"/>
+        <a:font script="Cans" typeface="Euphemia"/>
+        <a:font script="Cher" typeface="Plantagenet Cherokee"/>
+        <a:font script="Yiii" typeface="Microsoft Yi Baiti"/>
+        <a:font script="Tibt" typeface="Microsoft Himalaya"/>
+        <a:font script="Thaa" typeface="MV Boli"/>
+        <a:font script="Deva" typeface="Mangal"/>
+        <a:font script="Telu" typeface="Gautami"/>
+        <a:font script="Taml" typeface="Latha"/>
+        <a:font script="Syrc" typeface="Estrangelo Edessa"/>
+        <a:font script="Orya" typeface="Kalinga"/>
+        <a:font script="Mlym" typeface="Kartika"/>
+        <a:font script="Laoo" typeface="DokChampa"/>
+        <a:font script="Sinh" typeface="Iskoola Pota"/>
+        <a:font script="Mong" typeface="Mongolian Baiti"/>
+        <a:font script="Viet" typeface="Arial"/>
+        <a:font script="Uigh" typeface="Microsoft Uighur"/>
+        <a:font script="Geor" typeface="Sylfaen"/>
+      </a:minorFont>
+    </a:fontScheme>
+    <a:fmtScheme name="Office">
+      <a:fillStyleLst>
+        <a:solidFill>
+          <a:schemeClr val="phClr"/>
+        </a:solidFill>
+        <a:gradFill rotWithShape="1">
+          <a:gsLst>
+            <a:gs pos="0">
+              <a:schemeClr val="phClr">
+                <a:lumMod val="110000"/>
+                <a:satMod val="105000"/>
+                <a:tint val="67000"/>
+              </a:schemeClr>
+            </a:gs>
+            <a:gs pos="50000">
+              <a:schemeClr val="phClr">
+                <a:lumMod val="105000"/>
+                <a:satMod val="103000"/>
+                <a:tint val="73000"/>
+              </a:schemeClr>
+            </a:gs>
+            <a:gs pos="100000">
+              <a:schemeClr val="phClr">
+                <a:lumMod val="105000"/>
+                <a:satMod val="109000"/>
+                <a:tint val="81000"/>
+              </a:schemeClr>
+            </a:gs>
+          </a:gsLst>
+          <a:lin ang="5400000" scaled="0"/>
+        </a:gradFill>
+        <a:gradFill rotWithShape="1">
+          <a:gsLst>
+            <a:gs pos="0">
+              <a:schemeClr val="phClr">
+                <a:satMod val="103000"/>
+                <a:lumMod val="102000"/>
+                <a:tint val="94000"/>
+              </a:schemeClr>
+            </a:gs>
+            <a:gs pos="50000">
+              <a:schemeClr val="phClr">
+                <a:satMod val="110000"/>
+                <a:lumMod val="100000"/>
+                <a:shade val="100000"/>
+              </a:schemeClr>
+            </a:gs>
+            <a:gs pos="100000">
+              <a:schemeClr val="phClr">
+                <a:lumMod val="99000"/>
+                <a:satMod val="120000"/>
+                <a:shade val="78000"/>
+              </a:schemeClr>
+            </a:gs>
+          </a:gsLst>
+          <a:lin ang="5400000" scaled="0"/>
+        </a:gradFill>
+      </a:fillStyleLst>
+      <a:lnStyleLst>
+        <a:ln w="6350" cap="flat" cmpd="sng" algn="ctr">
+          <a:solidFill>
+            <a:schemeClr val="phClr"/>
+          </a:solidFill>
+          <a:prstDash val="solid"/>
+          <a:miter lim="800000"/>
+        </a:ln>
+        <a:ln w="12700" cap="flat" cmpd="sng" algn="ctr">
+          <a:solidFill>
+            <a:schemeClr val="phClr"/>
+          </a:solidFill>
+          <a:prstDash val="solid"/>
+          <a:miter lim="800000"/>
+        </a:ln>
+        <a:ln w="19050" cap="flat" cmpd="sng" algn="ctr">
+          <a:solidFill>
+            <a:schemeClr val="phClr"/>
+          </a:solidFill>
+          <a:prstDash val="solid"/>
+          <a:miter lim="800000"/>
+        </a:ln>
+      </a:lnStyleLst>
+      <a:effectStyleLst>
+        <a:effectStyle>
+          <a:effectLst/>
+        </a:effectStyle>
+        <a:effectStyle>
+          <a:effectLst/>
+        </a:effectStyle>
+        <a:effectStyle>
+          <a:effectLst>
+            <a:outerShdw blurRad="57150" dist="19050" dir="5400000" algn="ctr" rotWithShape="0">
+              <a:srgbClr val="000000">
+                <a:alpha val="63000"/>
+              </a:srgbClr>
+            </a:outerShdw>
+          </a:effectLst>
+        </a:effectStyle>
+      </a:effectStyleLst>
+      <a:bgFillStyleLst>
+        <a:solidFill>
+          <a:schemeClr val="phClr"/>
+        </a:solidFill>
+        <a:solidFill>
+          <a:schemeClr val="phClr">
+            <a:tint val="95000"/>
+            <a:satMod val="170000"/>
+          </a:schemeClr>
+        </a:solidFill>
+        <a:gradFill rotWithShape="1">
+          <a:gsLst>
+            <a:gs pos="0">
+              <a:schemeClr val="phClr">
+                <a:tint val="93000"/>
+                <a:satMod val="150000"/>
+                <a:shade val="98000"/>
+                <a:lumMod val="102000"/>
+              </a:schemeClr>
+            </a:gs>
+            <a:gs pos="50000">
+              <a:schemeClr val="phClr">
+                <a:tint val="98000"/>
+                <a:satMod val="130000"/>
+                <a:shade val="90000"/>
+                <a:lumMod val="103000"/>
+              </a:schemeClr>
+            </a:gs>
+            <a:gs pos="100000">
+              <a:schemeClr val="phClr">
+                <a:shade val="63000"/>
+                <a:satMod val="120000"/>
+              </a:schemeClr>
+            </a:gs>
+          </a:gsLst>
+          <a:lin ang="5400000" scaled="0"/>
+        </a:gradFill>
+      </a:bgFillStyleLst>
+    </a:fmtScheme>
+  </a:themeElements>
+  <a:objectDefaults/>
+  <a:extraClrSchemeLst/>
+  <a:extLst>
+    <a:ext uri="{05A4C25C-085E-4340-85A3-A5531E510DB2}">
+      <thm15:themeFamily xmlns:thm15="http://schemas.microsoft.com/office/thememl/2012/main" name="Office Theme" id="{62F939B6-93AF-4DB8-9C6B-D6C7DFDC589F}" vid="{4A3C46E8-61CC-4603-A589-7422A47A8E4A}"/>
+    </a:ext>
+  </a:extLst>
+</a:theme>
 </file>
</xml_diff>